<commit_message>
added stuff for session 2
</commit_message>
<xml_diff>
--- a/Session 2/Softdev Session 2 2016.pptx
+++ b/Session 2/Softdev Session 2 2016.pptx
@@ -23,8 +23,14 @@
     <p:sldId id="300" r:id="rId17"/>
     <p:sldId id="303" r:id="rId18"/>
     <p:sldId id="301" r:id="rId19"/>
-    <p:sldId id="302" r:id="rId20"/>
-    <p:sldId id="285" r:id="rId21"/>
+    <p:sldId id="304" r:id="rId20"/>
+    <p:sldId id="309" r:id="rId21"/>
+    <p:sldId id="302" r:id="rId22"/>
+    <p:sldId id="305" r:id="rId23"/>
+    <p:sldId id="306" r:id="rId24"/>
+    <p:sldId id="307" r:id="rId25"/>
+    <p:sldId id="308" r:id="rId26"/>
+    <p:sldId id="285" r:id="rId27"/>
   </p:sldIdLst>
   <p:sldSz cx="12192000" cy="6858000"/>
   <p:notesSz cx="6858000" cy="9144000"/>
@@ -125,7 +131,7 @@
   </p:defaultTextStyle>
   <p:extLst>
     <p:ext uri="{EFAFB233-063F-42B5-8137-9DF3F51BA10A}">
-      <p15:sldGuideLst xmlns:p15="http://schemas.microsoft.com/office/powerpoint/2012/main">
+      <p15:sldGuideLst xmlns:p15="http://schemas.microsoft.com/office/powerpoint/2012/main" xmlns="">
         <p15:guide id="1" orient="horz" pos="2160">
           <p15:clr>
             <a:srgbClr val="A4A3A4"/>
@@ -328,7 +334,7 @@
           <a:p>
             <a:fld id="{FBDF5932-50BA-4683-BD71-901965AADFF2}" type="datetimeFigureOut">
               <a:rPr lang="en-ZA" smtClean="0"/>
-              <a:t>2016/09/11</a:t>
+              <a:t>2016-09-12</a:t>
             </a:fld>
             <a:endParaRPr lang="en-ZA"/>
           </a:p>
@@ -603,7 +609,7 @@
           <a:p>
             <a:fld id="{FBDF5932-50BA-4683-BD71-901965AADFF2}" type="datetimeFigureOut">
               <a:rPr lang="en-ZA" smtClean="0"/>
-              <a:t>2016/09/11</a:t>
+              <a:t>2016-09-12</a:t>
             </a:fld>
             <a:endParaRPr lang="en-ZA"/>
           </a:p>
@@ -797,7 +803,7 @@
           <a:p>
             <a:fld id="{FBDF5932-50BA-4683-BD71-901965AADFF2}" type="datetimeFigureOut">
               <a:rPr lang="en-ZA" smtClean="0"/>
-              <a:t>2016/09/11</a:t>
+              <a:t>2016-09-12</a:t>
             </a:fld>
             <a:endParaRPr lang="en-ZA"/>
           </a:p>
@@ -1068,7 +1074,7 @@
           <a:p>
             <a:fld id="{FBDF5932-50BA-4683-BD71-901965AADFF2}" type="datetimeFigureOut">
               <a:rPr lang="en-ZA" smtClean="0"/>
-              <a:t>2016/09/11</a:t>
+              <a:t>2016-09-12</a:t>
             </a:fld>
             <a:endParaRPr lang="en-ZA"/>
           </a:p>
@@ -1395,7 +1401,7 @@
           <a:p>
             <a:fld id="{FBDF5932-50BA-4683-BD71-901965AADFF2}" type="datetimeFigureOut">
               <a:rPr lang="en-ZA" smtClean="0"/>
-              <a:t>2016/09/11</a:t>
+              <a:t>2016-09-12</a:t>
             </a:fld>
             <a:endParaRPr lang="en-ZA"/>
           </a:p>
@@ -2014,7 +2020,7 @@
           <a:p>
             <a:fld id="{FBDF5932-50BA-4683-BD71-901965AADFF2}" type="datetimeFigureOut">
               <a:rPr lang="en-ZA" smtClean="0"/>
-              <a:t>2016/09/11</a:t>
+              <a:t>2016-09-12</a:t>
             </a:fld>
             <a:endParaRPr lang="en-ZA"/>
           </a:p>
@@ -2861,7 +2867,7 @@
           <a:p>
             <a:fld id="{FBDF5932-50BA-4683-BD71-901965AADFF2}" type="datetimeFigureOut">
               <a:rPr lang="en-ZA" smtClean="0"/>
-              <a:t>2016/09/11</a:t>
+              <a:t>2016-09-12</a:t>
             </a:fld>
             <a:endParaRPr lang="en-ZA"/>
           </a:p>
@@ -3031,7 +3037,7 @@
           <a:p>
             <a:fld id="{FBDF5932-50BA-4683-BD71-901965AADFF2}" type="datetimeFigureOut">
               <a:rPr lang="en-ZA" smtClean="0"/>
-              <a:t>2016/09/11</a:t>
+              <a:t>2016-09-12</a:t>
             </a:fld>
             <a:endParaRPr lang="en-ZA"/>
           </a:p>
@@ -3211,7 +3217,7 @@
           <a:p>
             <a:fld id="{FBDF5932-50BA-4683-BD71-901965AADFF2}" type="datetimeFigureOut">
               <a:rPr lang="en-ZA" smtClean="0"/>
-              <a:t>2016/09/11</a:t>
+              <a:t>2016-09-12</a:t>
             </a:fld>
             <a:endParaRPr lang="en-ZA"/>
           </a:p>
@@ -3381,7 +3387,7 @@
           <a:p>
             <a:fld id="{FBDF5932-50BA-4683-BD71-901965AADFF2}" type="datetimeFigureOut">
               <a:rPr lang="en-ZA" smtClean="0"/>
-              <a:t>2016/09/11</a:t>
+              <a:t>2016-09-12</a:t>
             </a:fld>
             <a:endParaRPr lang="en-ZA"/>
           </a:p>
@@ -3628,7 +3634,7 @@
           <a:p>
             <a:fld id="{FBDF5932-50BA-4683-BD71-901965AADFF2}" type="datetimeFigureOut">
               <a:rPr lang="en-ZA" smtClean="0"/>
-              <a:t>2016/09/11</a:t>
+              <a:t>2016-09-12</a:t>
             </a:fld>
             <a:endParaRPr lang="en-ZA"/>
           </a:p>
@@ -3920,7 +3926,7 @@
           <a:p>
             <a:fld id="{FBDF5932-50BA-4683-BD71-901965AADFF2}" type="datetimeFigureOut">
               <a:rPr lang="en-ZA" smtClean="0"/>
-              <a:t>2016/09/11</a:t>
+              <a:t>2016-09-12</a:t>
             </a:fld>
             <a:endParaRPr lang="en-ZA"/>
           </a:p>
@@ -4364,7 +4370,7 @@
           <a:p>
             <a:fld id="{FBDF5932-50BA-4683-BD71-901965AADFF2}" type="datetimeFigureOut">
               <a:rPr lang="en-ZA" smtClean="0"/>
-              <a:t>2016/09/11</a:t>
+              <a:t>2016-09-12</a:t>
             </a:fld>
             <a:endParaRPr lang="en-ZA"/>
           </a:p>
@@ -4482,7 +4488,7 @@
           <a:p>
             <a:fld id="{FBDF5932-50BA-4683-BD71-901965AADFF2}" type="datetimeFigureOut">
               <a:rPr lang="en-ZA" smtClean="0"/>
-              <a:t>2016/09/11</a:t>
+              <a:t>2016-09-12</a:t>
             </a:fld>
             <a:endParaRPr lang="en-ZA"/>
           </a:p>
@@ -4577,7 +4583,7 @@
           <a:p>
             <a:fld id="{FBDF5932-50BA-4683-BD71-901965AADFF2}" type="datetimeFigureOut">
               <a:rPr lang="en-ZA" smtClean="0"/>
-              <a:t>2016/09/11</a:t>
+              <a:t>2016-09-12</a:t>
             </a:fld>
             <a:endParaRPr lang="en-ZA"/>
           </a:p>
@@ -4856,7 +4862,7 @@
           <a:p>
             <a:fld id="{FBDF5932-50BA-4683-BD71-901965AADFF2}" type="datetimeFigureOut">
               <a:rPr lang="en-ZA" smtClean="0"/>
-              <a:t>2016/09/11</a:t>
+              <a:t>2016-09-12</a:t>
             </a:fld>
             <a:endParaRPr lang="en-ZA"/>
           </a:p>
@@ -5131,7 +5137,7 @@
           <a:p>
             <a:fld id="{FBDF5932-50BA-4683-BD71-901965AADFF2}" type="datetimeFigureOut">
               <a:rPr lang="en-ZA" smtClean="0"/>
-              <a:t>2016/09/11</a:t>
+              <a:t>2016-09-12</a:t>
             </a:fld>
             <a:endParaRPr lang="en-ZA"/>
           </a:p>
@@ -5554,7 +5560,7 @@
           <a:p>
             <a:fld id="{FBDF5932-50BA-4683-BD71-901965AADFF2}" type="datetimeFigureOut">
               <a:rPr lang="en-ZA" smtClean="0"/>
-              <a:t>2016/09/11</a:t>
+              <a:t>2016-09-12</a:t>
             </a:fld>
             <a:endParaRPr lang="en-ZA"/>
           </a:p>
@@ -6550,8 +6556,8 @@
         </p:nvSpPr>
         <p:spPr>
           <a:xfrm>
-            <a:off x="8328249" y="4756502"/>
-            <a:ext cx="1994457" cy="369332"/>
+            <a:off x="5436625" y="6309531"/>
+            <a:ext cx="6755375" cy="369332"/>
           </a:xfrm>
           <a:prstGeom prst="rect">
             <a:avLst/>
@@ -6566,7 +6572,7 @@
           <a:p>
             <a:r>
               <a:rPr lang="en-ZA" dirty="0"/>
-              <a:t>*From Wikipedia</a:t>
+              <a:t>https://en.wikipedia.org/wiki/Agile_software_development</a:t>
             </a:r>
             <a:endParaRPr lang="en-ZA" dirty="0"/>
           </a:p>
@@ -6642,7 +6648,12 @@
             <p:ph idx="1"/>
           </p:nvPr>
         </p:nvSpPr>
-        <p:spPr/>
+        <p:spPr>
+          <a:xfrm>
+            <a:off x="1034040" y="1831245"/>
+            <a:ext cx="8946541" cy="4195481"/>
+          </a:xfrm>
+        </p:spPr>
         <p:txBody>
           <a:bodyPr/>
           <a:lstStyle/>
@@ -6684,7 +6695,23 @@
         </p:nvPicPr>
         <p:blipFill>
           <a:blip r:embed="rId3" cstate="print">
+            <a:duotone>
+              <a:schemeClr val="accent2">
+                <a:shade val="45000"/>
+                <a:satMod val="135000"/>
+              </a:schemeClr>
+              <a:prstClr val="white"/>
+            </a:duotone>
             <a:extLst>
+              <a:ext uri="{BEBA8EAE-BF5A-486C-A8C5-ECC9F3942E4B}">
+                <a14:imgProps xmlns:a14="http://schemas.microsoft.com/office/drawing/2010/main">
+                  <a14:imgLayer r:embed="rId4">
+                    <a14:imgEffect>
+                      <a14:brightnessContrast bright="20000" contrast="-40000"/>
+                    </a14:imgEffect>
+                  </a14:imgLayer>
+                </a14:imgProps>
+              </a:ext>
               <a:ext uri="{28A0092B-C50C-407E-A947-70E740481C1C}">
                 <a14:useLocalDpi xmlns:a14="http://schemas.microsoft.com/office/drawing/2010/main" val="0"/>
               </a:ext>
@@ -6697,7 +6724,7 @@
         </p:blipFill>
         <p:spPr bwMode="auto">
           <a:xfrm>
-            <a:off x="2423592" y="1556792"/>
+            <a:off x="2049519" y="3094646"/>
             <a:ext cx="7240688" cy="3620344"/>
           </a:xfrm>
           <a:prstGeom prst="rect">
@@ -6785,7 +6812,12 @@
             <p:ph idx="1"/>
           </p:nvPr>
         </p:nvSpPr>
-        <p:spPr/>
+        <p:spPr>
+          <a:xfrm>
+            <a:off x="1047894" y="1651136"/>
+            <a:ext cx="8946541" cy="4195481"/>
+          </a:xfrm>
+        </p:spPr>
         <p:txBody>
           <a:bodyPr>
             <a:normAutofit lnSpcReduction="10000"/>
@@ -6838,8 +6870,9 @@
             </a:pPr>
             <a:r>
               <a:rPr lang="en-ZA" dirty="0" smtClean="0"/>
-              <a:t>Team</a:t>
-            </a:r>
+              <a:t>Team Member</a:t>
+            </a:r>
+            <a:endParaRPr lang="en-ZA" dirty="0" smtClean="0"/>
           </a:p>
           <a:p>
             <a:pPr lvl="1">
@@ -6959,7 +6992,7 @@
         </p:nvSpPr>
         <p:spPr>
           <a:xfrm>
-            <a:off x="1754532" y="1535218"/>
+            <a:off x="1047950" y="1470552"/>
             <a:ext cx="4397112" cy="3579849"/>
           </a:xfrm>
         </p:spPr>
@@ -7526,13 +7559,27 @@
           <a:p>
             <a:r>
               <a:rPr lang="en-ZA" dirty="0" smtClean="0"/>
-              <a:t>We will only speak about </a:t>
-            </a:r>
-            <a:r>
-              <a:rPr lang="en-ZA" smtClean="0"/>
-              <a:t>a few</a:t>
-            </a:r>
-            <a:endParaRPr lang="en-ZA"/>
+              <a:t>We will only speak about a </a:t>
+            </a:r>
+            <a:r>
+              <a:rPr lang="en-ZA" dirty="0" smtClean="0"/>
+              <a:t>few models</a:t>
+            </a:r>
+          </a:p>
+          <a:p>
+            <a:pPr lvl="1"/>
+            <a:r>
+              <a:rPr lang="en-US" dirty="0" smtClean="0"/>
+              <a:t>Layered Software</a:t>
+            </a:r>
+          </a:p>
+          <a:p>
+            <a:pPr lvl="1"/>
+            <a:r>
+              <a:rPr lang="en-US" dirty="0" smtClean="0"/>
+              <a:t>Event Driven Model</a:t>
+            </a:r>
+            <a:endParaRPr lang="en-ZA" dirty="0"/>
           </a:p>
         </p:txBody>
       </p:sp>
@@ -7620,8 +7667,35 @@
             </a:pPr>
             <a:r>
               <a:rPr lang="en-ZA" dirty="0" smtClean="0"/>
-              <a:t>This allows black box design</a:t>
-            </a:r>
+              <a:t>This allows black box </a:t>
+            </a:r>
+            <a:r>
+              <a:rPr lang="en-ZA" dirty="0" smtClean="0"/>
+              <a:t>design</a:t>
+            </a:r>
+          </a:p>
+          <a:p>
+            <a:pPr>
+              <a:buFont typeface="Arial" panose="020B0604020202020204" pitchFamily="34" charset="0"/>
+              <a:buChar char="•"/>
+            </a:pPr>
+            <a:endParaRPr lang="en-US" dirty="0"/>
+          </a:p>
+          <a:p>
+            <a:pPr>
+              <a:buFont typeface="Arial" panose="020B0604020202020204" pitchFamily="34" charset="0"/>
+              <a:buChar char="•"/>
+            </a:pPr>
+            <a:r>
+              <a:rPr lang="en-US" dirty="0" smtClean="0"/>
+              <a:t>RESTful API</a:t>
+            </a:r>
+          </a:p>
+          <a:p>
+            <a:pPr>
+              <a:buFont typeface="Arial" panose="020B0604020202020204" pitchFamily="34" charset="0"/>
+              <a:buChar char="•"/>
+            </a:pPr>
             <a:endParaRPr lang="en-ZA" dirty="0"/>
           </a:p>
         </p:txBody>
@@ -7672,8 +7746,8 @@
           <a:lstStyle/>
           <a:p>
             <a:r>
-              <a:rPr lang="en-ZA" dirty="0" smtClean="0"/>
-              <a:t>Model View Controller (MVC)</a:t>
+              <a:rPr lang="en-US" dirty="0" smtClean="0"/>
+              <a:t>Layered Software Model</a:t>
             </a:r>
             <a:endParaRPr lang="en-ZA" dirty="0"/>
           </a:p>
@@ -7689,97 +7763,102 @@
             <p:ph idx="1"/>
           </p:nvPr>
         </p:nvSpPr>
-        <p:spPr/>
+        <p:spPr>
+          <a:xfrm>
+            <a:off x="950913" y="1892800"/>
+            <a:ext cx="6669088" cy="4195481"/>
+          </a:xfrm>
+        </p:spPr>
         <p:txBody>
           <a:bodyPr/>
           <a:lstStyle/>
           <a:p>
-            <a:pPr fontAlgn="base">
-              <a:buFont typeface="Arial" panose="020B0604020202020204" pitchFamily="34" charset="0"/>
-              <a:buChar char="•"/>
-            </a:pPr>
-            <a:r>
-              <a:rPr lang="en-ZA" dirty="0" smtClean="0"/>
-              <a:t>Models</a:t>
-            </a:r>
+            <a:r>
+              <a:rPr lang="en-US" dirty="0" smtClean="0"/>
+              <a:t>Application Logic is broken up into layers</a:t>
+            </a:r>
+          </a:p>
+          <a:p>
+            <a:r>
+              <a:rPr lang="en-US" dirty="0" smtClean="0"/>
+              <a:t>Can have sub layers</a:t>
+            </a:r>
+          </a:p>
+          <a:p>
+            <a:r>
+              <a:rPr lang="en-US" dirty="0" smtClean="0"/>
+              <a:t>Specific parts should stay in the same layer</a:t>
+            </a:r>
+          </a:p>
+          <a:p>
             <a:r>
               <a:rPr lang="en-ZA" dirty="0"/>
-              <a:t>: Classes that represent the data of the application and that use validation logic to enforce business rules for that data.</a:t>
-            </a:r>
-          </a:p>
-          <a:p>
-            <a:pPr fontAlgn="base">
-              <a:buFont typeface="Arial" panose="020B0604020202020204" pitchFamily="34" charset="0"/>
-              <a:buChar char="•"/>
-            </a:pPr>
-            <a:r>
-              <a:rPr lang="en-ZA" dirty="0"/>
-              <a:t>Views: Template files that your application uses to dynamically generate HTML responses.</a:t>
-            </a:r>
-          </a:p>
-          <a:p>
-            <a:pPr fontAlgn="base">
-              <a:buFont typeface="Arial" panose="020B0604020202020204" pitchFamily="34" charset="0"/>
-              <a:buChar char="•"/>
-            </a:pPr>
-            <a:r>
-              <a:rPr lang="en-ZA" dirty="0"/>
-              <a:t>Controllers: Classes that handle incoming browser requests, retrieve model data, and then specify view templates that return a response to the </a:t>
-            </a:r>
-            <a:r>
-              <a:rPr lang="en-ZA" dirty="0" smtClean="0"/>
-              <a:t>browser</a:t>
-            </a:r>
-          </a:p>
-          <a:p>
-            <a:pPr fontAlgn="base">
-              <a:buFont typeface="Arial" panose="020B0604020202020204" pitchFamily="34" charset="0"/>
-              <a:buChar char="•"/>
-            </a:pPr>
+              <a:t>https://en.wikipedia.org/wiki/Multilayered_architecture</a:t>
+            </a:r>
+          </a:p>
+          <a:p>
             <a:endParaRPr lang="en-ZA" dirty="0"/>
           </a:p>
-          <a:p>
-            <a:pPr fontAlgn="base">
-              <a:buFont typeface="Arial" panose="020B0604020202020204" pitchFamily="34" charset="0"/>
-              <a:buChar char="•"/>
-            </a:pPr>
-            <a:r>
-              <a:rPr lang="en-ZA" dirty="0" smtClean="0"/>
-              <a:t>Structures code</a:t>
-            </a:r>
-          </a:p>
-          <a:p>
-            <a:pPr fontAlgn="base">
-              <a:buFont typeface="Arial" panose="020B0604020202020204" pitchFamily="34" charset="0"/>
-              <a:buChar char="•"/>
-            </a:pPr>
-            <a:r>
-              <a:rPr lang="en-ZA" dirty="0" smtClean="0"/>
-              <a:t>Makes it more testable</a:t>
-            </a:r>
-          </a:p>
-          <a:p>
-            <a:pPr>
-              <a:buFont typeface="Arial" panose="020B0604020202020204" pitchFamily="34" charset="0"/>
-              <a:buChar char="•"/>
-            </a:pPr>
-            <a:endParaRPr lang="en-ZA" dirty="0"/>
-          </a:p>
-          <a:p>
-            <a:endParaRPr lang="en-ZA" dirty="0"/>
-          </a:p>
-        </p:txBody>
-      </p:sp>
+        </p:txBody>
+      </p:sp>
+      <p:pic>
+        <p:nvPicPr>
+          <p:cNvPr id="1026" name="Picture 2" descr="C:\development\SoftDev2016\Session 2\construction\Layered Architecture.png"/>
+          <p:cNvPicPr>
+            <a:picLocks noChangeAspect="1" noChangeArrowheads="1"/>
+          </p:cNvPicPr>
+          <p:nvPr/>
+        </p:nvPicPr>
+        <p:blipFill>
+          <a:blip r:embed="rId2">
+            <a:extLst>
+              <a:ext uri="{28A0092B-C50C-407E-A947-70E740481C1C}">
+                <a14:useLocalDpi xmlns:a14="http://schemas.microsoft.com/office/drawing/2010/main" val="0"/>
+              </a:ext>
+            </a:extLst>
+          </a:blip>
+          <a:srcRect/>
+          <a:stretch>
+            <a:fillRect/>
+          </a:stretch>
+        </p:blipFill>
+        <p:spPr bwMode="auto">
+          <a:xfrm>
+            <a:off x="8058583" y="1188892"/>
+            <a:ext cx="3362325" cy="5076825"/>
+          </a:xfrm>
+          <a:prstGeom prst="rect">
+            <a:avLst/>
+          </a:prstGeom>
+          <a:noFill/>
+          <a:extLst>
+            <a:ext uri="{909E8E84-426E-40DD-AFC4-6F175D3DCCD1}">
+              <a14:hiddenFill xmlns:a14="http://schemas.microsoft.com/office/drawing/2010/main">
+                <a:solidFill>
+                  <a:srgbClr val="FFFFFF"/>
+                </a:solidFill>
+              </a14:hiddenFill>
+            </a:ext>
+          </a:extLst>
+        </p:spPr>
+      </p:pic>
     </p:spTree>
     <p:extLst>
       <p:ext uri="{BB962C8B-B14F-4D97-AF65-F5344CB8AC3E}">
-        <p14:creationId xmlns:p14="http://schemas.microsoft.com/office/powerpoint/2010/main" val="2592488307"/>
+        <p14:creationId xmlns:p14="http://schemas.microsoft.com/office/powerpoint/2010/main" val="497918643"/>
       </p:ext>
     </p:extLst>
   </p:cSld>
   <p:clrMapOvr>
     <a:masterClrMapping/>
   </p:clrMapOvr>
+  <p:timing>
+    <p:tnLst>
+      <p:par>
+        <p:cTn id="1" dur="indefinite" restart="never" nodeType="tmRoot"/>
+      </p:par>
+    </p:tnLst>
+  </p:timing>
 </p:sld>
 </file>
 
@@ -7943,6 +8022,840 @@
 </file>
 
 <file path=ppt/slides/slide20.xml><?xml version="1.0" encoding="utf-8"?>
+<p:sld xmlns:a="http://schemas.openxmlformats.org/drawingml/2006/main" xmlns:r="http://schemas.openxmlformats.org/officeDocument/2006/relationships" xmlns:p="http://schemas.openxmlformats.org/presentationml/2006/main">
+  <p:cSld>
+    <p:spTree>
+      <p:nvGrpSpPr>
+        <p:cNvPr id="1" name=""/>
+        <p:cNvGrpSpPr/>
+        <p:nvPr/>
+      </p:nvGrpSpPr>
+      <p:grpSpPr>
+        <a:xfrm>
+          <a:off x="0" y="0"/>
+          <a:ext cx="0" cy="0"/>
+          <a:chOff x="0" y="0"/>
+          <a:chExt cx="0" cy="0"/>
+        </a:xfrm>
+      </p:grpSpPr>
+      <p:sp>
+        <p:nvSpPr>
+          <p:cNvPr id="2" name="Title 1"/>
+          <p:cNvSpPr>
+            <a:spLocks noGrp="1"/>
+          </p:cNvSpPr>
+          <p:nvPr>
+            <p:ph type="title"/>
+          </p:nvPr>
+        </p:nvSpPr>
+        <p:spPr/>
+        <p:txBody>
+          <a:bodyPr/>
+          <a:lstStyle/>
+          <a:p>
+            <a:r>
+              <a:rPr lang="en-US" dirty="0" smtClean="0"/>
+              <a:t>Modular Development</a:t>
+            </a:r>
+            <a:endParaRPr lang="en-ZA" dirty="0"/>
+          </a:p>
+        </p:txBody>
+      </p:sp>
+      <p:sp>
+        <p:nvSpPr>
+          <p:cNvPr id="3" name="Content Placeholder 2"/>
+          <p:cNvSpPr>
+            <a:spLocks noGrp="1"/>
+          </p:cNvSpPr>
+          <p:nvPr>
+            <p:ph idx="1"/>
+          </p:nvPr>
+        </p:nvSpPr>
+        <p:spPr/>
+        <p:txBody>
+          <a:bodyPr/>
+          <a:lstStyle/>
+          <a:p>
+            <a:r>
+              <a:rPr lang="en-US" dirty="0" smtClean="0"/>
+              <a:t>Code is broken up into modules</a:t>
+            </a:r>
+          </a:p>
+          <a:p>
+            <a:r>
+              <a:rPr lang="en-US" dirty="0" smtClean="0"/>
+              <a:t>Concerns are broken up into modular parts</a:t>
+            </a:r>
+          </a:p>
+          <a:p>
+            <a:r>
+              <a:rPr lang="en-US" dirty="0" smtClean="0"/>
+              <a:t>Written separately and shared across</a:t>
+            </a:r>
+          </a:p>
+          <a:p>
+            <a:r>
+              <a:rPr lang="en-US" dirty="0" smtClean="0"/>
+              <a:t>Can have independent development teams</a:t>
+            </a:r>
+          </a:p>
+          <a:p>
+            <a:r>
+              <a:rPr lang="en-US" dirty="0" smtClean="0"/>
+              <a:t>Code reuse is very strong</a:t>
+            </a:r>
+          </a:p>
+          <a:p>
+            <a:r>
+              <a:rPr lang="en-US" dirty="0" smtClean="0"/>
+              <a:t>There are some downsides</a:t>
+            </a:r>
+          </a:p>
+          <a:p>
+            <a:pPr lvl="1"/>
+            <a:r>
+              <a:rPr lang="en-US" dirty="0" smtClean="0"/>
+              <a:t>Lack of testing – its harder</a:t>
+            </a:r>
+          </a:p>
+          <a:p>
+            <a:pPr lvl="1"/>
+            <a:r>
+              <a:rPr lang="en-US" dirty="0" smtClean="0"/>
+              <a:t>Inconsistent programming</a:t>
+            </a:r>
+          </a:p>
+          <a:p>
+            <a:pPr lvl="1"/>
+            <a:r>
+              <a:rPr lang="en-US" dirty="0" smtClean="0"/>
+              <a:t>Dependent on potentially unknown software</a:t>
+            </a:r>
+          </a:p>
+          <a:p>
+            <a:r>
+              <a:rPr lang="en-ZA" dirty="0"/>
+              <a:t>https://en.wikipedia.org/wiki/Modular_programming</a:t>
+            </a:r>
+          </a:p>
+        </p:txBody>
+      </p:sp>
+    </p:spTree>
+    <p:extLst>
+      <p:ext uri="{BB962C8B-B14F-4D97-AF65-F5344CB8AC3E}">
+        <p14:creationId xmlns:p14="http://schemas.microsoft.com/office/powerpoint/2010/main" val="2741912272"/>
+      </p:ext>
+    </p:extLst>
+  </p:cSld>
+  <p:clrMapOvr>
+    <a:masterClrMapping/>
+  </p:clrMapOvr>
+</p:sld>
+</file>
+
+<file path=ppt/slides/slide21.xml><?xml version="1.0" encoding="utf-8"?>
+<p:sld xmlns:a="http://schemas.openxmlformats.org/drawingml/2006/main" xmlns:r="http://schemas.openxmlformats.org/officeDocument/2006/relationships" xmlns:p="http://schemas.openxmlformats.org/presentationml/2006/main">
+  <p:cSld>
+    <p:spTree>
+      <p:nvGrpSpPr>
+        <p:cNvPr id="1" name=""/>
+        <p:cNvGrpSpPr/>
+        <p:nvPr/>
+      </p:nvGrpSpPr>
+      <p:grpSpPr>
+        <a:xfrm>
+          <a:off x="0" y="0"/>
+          <a:ext cx="0" cy="0"/>
+          <a:chOff x="0" y="0"/>
+          <a:chExt cx="0" cy="0"/>
+        </a:xfrm>
+      </p:grpSpPr>
+      <p:sp>
+        <p:nvSpPr>
+          <p:cNvPr id="2" name="Title 1"/>
+          <p:cNvSpPr>
+            <a:spLocks noGrp="1"/>
+          </p:cNvSpPr>
+          <p:nvPr>
+            <p:ph type="title"/>
+          </p:nvPr>
+        </p:nvSpPr>
+        <p:spPr/>
+        <p:txBody>
+          <a:bodyPr/>
+          <a:lstStyle/>
+          <a:p>
+            <a:r>
+              <a:rPr lang="en-ZA" dirty="0" smtClean="0"/>
+              <a:t>Model View Controller (MVC)</a:t>
+            </a:r>
+            <a:endParaRPr lang="en-ZA" dirty="0"/>
+          </a:p>
+        </p:txBody>
+      </p:sp>
+      <p:sp>
+        <p:nvSpPr>
+          <p:cNvPr id="3" name="Content Placeholder 2"/>
+          <p:cNvSpPr>
+            <a:spLocks noGrp="1"/>
+          </p:cNvSpPr>
+          <p:nvPr>
+            <p:ph idx="1"/>
+          </p:nvPr>
+        </p:nvSpPr>
+        <p:spPr/>
+        <p:txBody>
+          <a:bodyPr/>
+          <a:lstStyle/>
+          <a:p>
+            <a:pPr fontAlgn="base">
+              <a:buFont typeface="Arial" panose="020B0604020202020204" pitchFamily="34" charset="0"/>
+              <a:buChar char="•"/>
+            </a:pPr>
+            <a:r>
+              <a:rPr lang="en-ZA" dirty="0" smtClean="0"/>
+              <a:t>Models</a:t>
+            </a:r>
+            <a:r>
+              <a:rPr lang="en-ZA" dirty="0"/>
+              <a:t>: Classes that represent the data of the application and that use validation logic to enforce business rules for that data.</a:t>
+            </a:r>
+          </a:p>
+          <a:p>
+            <a:pPr fontAlgn="base">
+              <a:buFont typeface="Arial" panose="020B0604020202020204" pitchFamily="34" charset="0"/>
+              <a:buChar char="•"/>
+            </a:pPr>
+            <a:r>
+              <a:rPr lang="en-ZA" dirty="0"/>
+              <a:t>Views: Template files that your application uses to dynamically generate HTML responses.</a:t>
+            </a:r>
+          </a:p>
+          <a:p>
+            <a:pPr fontAlgn="base">
+              <a:buFont typeface="Arial" panose="020B0604020202020204" pitchFamily="34" charset="0"/>
+              <a:buChar char="•"/>
+            </a:pPr>
+            <a:r>
+              <a:rPr lang="en-ZA" dirty="0"/>
+              <a:t>Controllers: Classes that handle incoming browser requests, retrieve model data, and then specify view templates that return a response to the </a:t>
+            </a:r>
+            <a:r>
+              <a:rPr lang="en-ZA" dirty="0" smtClean="0"/>
+              <a:t>browser</a:t>
+            </a:r>
+          </a:p>
+          <a:p>
+            <a:pPr fontAlgn="base">
+              <a:buFont typeface="Arial" panose="020B0604020202020204" pitchFamily="34" charset="0"/>
+              <a:buChar char="•"/>
+            </a:pPr>
+            <a:endParaRPr lang="en-ZA" dirty="0"/>
+          </a:p>
+          <a:p>
+            <a:pPr fontAlgn="base">
+              <a:buFont typeface="Arial" panose="020B0604020202020204" pitchFamily="34" charset="0"/>
+              <a:buChar char="•"/>
+            </a:pPr>
+            <a:r>
+              <a:rPr lang="en-ZA" dirty="0" smtClean="0"/>
+              <a:t>Structures code</a:t>
+            </a:r>
+          </a:p>
+          <a:p>
+            <a:pPr fontAlgn="base">
+              <a:buFont typeface="Arial" panose="020B0604020202020204" pitchFamily="34" charset="0"/>
+              <a:buChar char="•"/>
+            </a:pPr>
+            <a:r>
+              <a:rPr lang="en-ZA" dirty="0" smtClean="0"/>
+              <a:t>Makes it more testable</a:t>
+            </a:r>
+          </a:p>
+          <a:p>
+            <a:pPr>
+              <a:buFont typeface="Arial" panose="020B0604020202020204" pitchFamily="34" charset="0"/>
+              <a:buChar char="•"/>
+            </a:pPr>
+            <a:endParaRPr lang="en-ZA" dirty="0"/>
+          </a:p>
+          <a:p>
+            <a:endParaRPr lang="en-ZA" dirty="0"/>
+          </a:p>
+        </p:txBody>
+      </p:sp>
+    </p:spTree>
+    <p:extLst>
+      <p:ext uri="{BB962C8B-B14F-4D97-AF65-F5344CB8AC3E}">
+        <p14:creationId xmlns:p14="http://schemas.microsoft.com/office/powerpoint/2010/main" val="2592488307"/>
+      </p:ext>
+    </p:extLst>
+  </p:cSld>
+  <p:clrMapOvr>
+    <a:masterClrMapping/>
+  </p:clrMapOvr>
+  <p:timing>
+    <p:tnLst>
+      <p:par>
+        <p:cTn id="1" dur="indefinite" restart="never" nodeType="tmRoot"/>
+      </p:par>
+    </p:tnLst>
+  </p:timing>
+</p:sld>
+</file>
+
+<file path=ppt/slides/slide22.xml><?xml version="1.0" encoding="utf-8"?>
+<p:sld xmlns:a="http://schemas.openxmlformats.org/drawingml/2006/main" xmlns:r="http://schemas.openxmlformats.org/officeDocument/2006/relationships" xmlns:p="http://schemas.openxmlformats.org/presentationml/2006/main">
+  <p:cSld>
+    <p:spTree>
+      <p:nvGrpSpPr>
+        <p:cNvPr id="1" name=""/>
+        <p:cNvGrpSpPr/>
+        <p:nvPr/>
+      </p:nvGrpSpPr>
+      <p:grpSpPr>
+        <a:xfrm>
+          <a:off x="0" y="0"/>
+          <a:ext cx="0" cy="0"/>
+          <a:chOff x="0" y="0"/>
+          <a:chExt cx="0" cy="0"/>
+        </a:xfrm>
+      </p:grpSpPr>
+      <p:sp>
+        <p:nvSpPr>
+          <p:cNvPr id="2" name="Title 1"/>
+          <p:cNvSpPr>
+            <a:spLocks noGrp="1"/>
+          </p:cNvSpPr>
+          <p:nvPr>
+            <p:ph type="title"/>
+          </p:nvPr>
+        </p:nvSpPr>
+        <p:spPr/>
+        <p:txBody>
+          <a:bodyPr/>
+          <a:lstStyle/>
+          <a:p>
+            <a:r>
+              <a:rPr lang="en-US" dirty="0" smtClean="0"/>
+              <a:t>Event Driven Model</a:t>
+            </a:r>
+            <a:endParaRPr lang="en-ZA" dirty="0"/>
+          </a:p>
+        </p:txBody>
+      </p:sp>
+      <p:sp>
+        <p:nvSpPr>
+          <p:cNvPr id="3" name="Content Placeholder 2"/>
+          <p:cNvSpPr>
+            <a:spLocks noGrp="1"/>
+          </p:cNvSpPr>
+          <p:nvPr>
+            <p:ph idx="1"/>
+          </p:nvPr>
+        </p:nvSpPr>
+        <p:spPr>
+          <a:xfrm>
+            <a:off x="6123708" y="1746872"/>
+            <a:ext cx="5347855" cy="4501528"/>
+          </a:xfrm>
+        </p:spPr>
+        <p:txBody>
+          <a:bodyPr/>
+          <a:lstStyle/>
+          <a:p>
+            <a:r>
+              <a:rPr lang="en-US" dirty="0" smtClean="0"/>
+              <a:t>Used in programming and the system design</a:t>
+            </a:r>
+          </a:p>
+          <a:p>
+            <a:r>
+              <a:rPr lang="en-US" dirty="0" err="1" smtClean="0"/>
+              <a:t>ExpressJS</a:t>
+            </a:r>
+            <a:r>
+              <a:rPr lang="en-US" dirty="0" smtClean="0"/>
+              <a:t> uses a hybrid model between Event driven and Model-View Controller</a:t>
+            </a:r>
+            <a:endParaRPr lang="en-ZA" dirty="0"/>
+          </a:p>
+        </p:txBody>
+      </p:sp>
+      <p:pic>
+        <p:nvPicPr>
+          <p:cNvPr id="2050" name="Picture 2" descr="C:\development\SoftDev2016\Session 2\construction\Event Driven Parallel.png"/>
+          <p:cNvPicPr>
+            <a:picLocks noChangeAspect="1" noChangeArrowheads="1"/>
+          </p:cNvPicPr>
+          <p:nvPr/>
+        </p:nvPicPr>
+        <p:blipFill>
+          <a:blip r:embed="rId2">
+            <a:extLst>
+              <a:ext uri="{28A0092B-C50C-407E-A947-70E740481C1C}">
+                <a14:useLocalDpi xmlns:a14="http://schemas.microsoft.com/office/drawing/2010/main" val="0"/>
+              </a:ext>
+            </a:extLst>
+          </a:blip>
+          <a:srcRect/>
+          <a:stretch>
+            <a:fillRect/>
+          </a:stretch>
+        </p:blipFill>
+        <p:spPr bwMode="auto">
+          <a:xfrm>
+            <a:off x="321974" y="2037817"/>
+            <a:ext cx="5663189" cy="3849356"/>
+          </a:xfrm>
+          <a:prstGeom prst="rect">
+            <a:avLst/>
+          </a:prstGeom>
+          <a:noFill/>
+          <a:extLst>
+            <a:ext uri="{909E8E84-426E-40DD-AFC4-6F175D3DCCD1}">
+              <a14:hiddenFill xmlns:a14="http://schemas.microsoft.com/office/drawing/2010/main">
+                <a:solidFill>
+                  <a:srgbClr val="FFFFFF"/>
+                </a:solidFill>
+              </a14:hiddenFill>
+            </a:ext>
+          </a:extLst>
+        </p:spPr>
+      </p:pic>
+    </p:spTree>
+    <p:extLst>
+      <p:ext uri="{BB962C8B-B14F-4D97-AF65-F5344CB8AC3E}">
+        <p14:creationId xmlns:p14="http://schemas.microsoft.com/office/powerpoint/2010/main" val="101869136"/>
+      </p:ext>
+    </p:extLst>
+  </p:cSld>
+  <p:clrMapOvr>
+    <a:masterClrMapping/>
+  </p:clrMapOvr>
+</p:sld>
+</file>
+
+<file path=ppt/slides/slide23.xml><?xml version="1.0" encoding="utf-8"?>
+<p:sld xmlns:a="http://schemas.openxmlformats.org/drawingml/2006/main" xmlns:r="http://schemas.openxmlformats.org/officeDocument/2006/relationships" xmlns:p="http://schemas.openxmlformats.org/presentationml/2006/main">
+  <p:cSld>
+    <p:spTree>
+      <p:nvGrpSpPr>
+        <p:cNvPr id="1" name=""/>
+        <p:cNvGrpSpPr/>
+        <p:nvPr/>
+      </p:nvGrpSpPr>
+      <p:grpSpPr>
+        <a:xfrm>
+          <a:off x="0" y="0"/>
+          <a:ext cx="0" cy="0"/>
+          <a:chOff x="0" y="0"/>
+          <a:chExt cx="0" cy="0"/>
+        </a:xfrm>
+      </p:grpSpPr>
+      <p:sp>
+        <p:nvSpPr>
+          <p:cNvPr id="2" name="Title 1"/>
+          <p:cNvSpPr>
+            <a:spLocks noGrp="1"/>
+          </p:cNvSpPr>
+          <p:nvPr>
+            <p:ph type="title"/>
+          </p:nvPr>
+        </p:nvSpPr>
+        <p:spPr/>
+        <p:txBody>
+          <a:bodyPr/>
+          <a:lstStyle/>
+          <a:p>
+            <a:r>
+              <a:rPr lang="en-US" dirty="0" smtClean="0"/>
+              <a:t>Express JS</a:t>
+            </a:r>
+            <a:endParaRPr lang="en-ZA" dirty="0"/>
+          </a:p>
+        </p:txBody>
+      </p:sp>
+      <p:sp>
+        <p:nvSpPr>
+          <p:cNvPr id="3" name="Content Placeholder 2"/>
+          <p:cNvSpPr>
+            <a:spLocks noGrp="1"/>
+          </p:cNvSpPr>
+          <p:nvPr>
+            <p:ph idx="1"/>
+          </p:nvPr>
+        </p:nvSpPr>
+        <p:spPr/>
+        <p:txBody>
+          <a:bodyPr/>
+          <a:lstStyle/>
+          <a:p>
+            <a:r>
+              <a:rPr lang="en-US" dirty="0" err="1" smtClean="0"/>
+              <a:t>npm</a:t>
+            </a:r>
+            <a:r>
+              <a:rPr lang="en-US" dirty="0" smtClean="0"/>
+              <a:t> install –g express</a:t>
+            </a:r>
+          </a:p>
+          <a:p>
+            <a:r>
+              <a:rPr lang="en-US" dirty="0" smtClean="0"/>
+              <a:t>express –</a:t>
+            </a:r>
+            <a:r>
+              <a:rPr lang="en-US" dirty="0" err="1" smtClean="0"/>
+              <a:t>ejs</a:t>
+            </a:r>
+            <a:r>
+              <a:rPr lang="en-US" dirty="0" smtClean="0"/>
+              <a:t> </a:t>
+            </a:r>
+          </a:p>
+          <a:p>
+            <a:pPr lvl="1"/>
+            <a:r>
+              <a:rPr lang="en-US" dirty="0" smtClean="0"/>
+              <a:t>Should generate a blank express project</a:t>
+            </a:r>
+          </a:p>
+          <a:p>
+            <a:r>
+              <a:rPr lang="en-US" dirty="0" smtClean="0"/>
+              <a:t>Some tutorials:</a:t>
+            </a:r>
+          </a:p>
+          <a:p>
+            <a:pPr lvl="1"/>
+            <a:r>
+              <a:rPr lang="en-US" dirty="0">
+                <a:hlinkClick r:id="rId2"/>
+              </a:rPr>
+              <a:t>http://nodeschool.io</a:t>
+            </a:r>
+            <a:r>
+              <a:rPr lang="en-US" dirty="0" smtClean="0">
+                <a:hlinkClick r:id="rId2"/>
+              </a:rPr>
+              <a:t>/</a:t>
+            </a:r>
+            <a:endParaRPr lang="en-US" dirty="0" smtClean="0"/>
+          </a:p>
+          <a:p>
+            <a:pPr lvl="1"/>
+            <a:r>
+              <a:rPr lang="en-ZA" dirty="0">
+                <a:hlinkClick r:id="rId3"/>
+              </a:rPr>
+              <a:t>https://</a:t>
+            </a:r>
+            <a:r>
+              <a:rPr lang="en-ZA" dirty="0" smtClean="0">
+                <a:hlinkClick r:id="rId3"/>
+              </a:rPr>
+              <a:t>scotch.io/tutorials/use-ejs-to-template-your-node-application</a:t>
+            </a:r>
+            <a:endParaRPr lang="en-ZA" dirty="0" smtClean="0"/>
+          </a:p>
+          <a:p>
+            <a:pPr lvl="1"/>
+            <a:r>
+              <a:rPr lang="en-ZA" dirty="0">
+                <a:hlinkClick r:id="rId4"/>
+              </a:rPr>
+              <a:t>http://www.danielgynn.com/build-an-authentication-app-using-express-node-passport</a:t>
+            </a:r>
+            <a:r>
+              <a:rPr lang="en-ZA" dirty="0" smtClean="0">
+                <a:hlinkClick r:id="rId4"/>
+              </a:rPr>
+              <a:t>/</a:t>
+            </a:r>
+            <a:endParaRPr lang="en-ZA" dirty="0" smtClean="0"/>
+          </a:p>
+          <a:p>
+            <a:pPr lvl="1"/>
+            <a:endParaRPr lang="en-ZA" dirty="0"/>
+          </a:p>
+        </p:txBody>
+      </p:sp>
+    </p:spTree>
+    <p:extLst>
+      <p:ext uri="{BB962C8B-B14F-4D97-AF65-F5344CB8AC3E}">
+        <p14:creationId xmlns:p14="http://schemas.microsoft.com/office/powerpoint/2010/main" val="2745146728"/>
+      </p:ext>
+    </p:extLst>
+  </p:cSld>
+  <p:clrMapOvr>
+    <a:masterClrMapping/>
+  </p:clrMapOvr>
+</p:sld>
+</file>
+
+<file path=ppt/slides/slide24.xml><?xml version="1.0" encoding="utf-8"?>
+<p:sld xmlns:a="http://schemas.openxmlformats.org/drawingml/2006/main" xmlns:r="http://schemas.openxmlformats.org/officeDocument/2006/relationships" xmlns:p="http://schemas.openxmlformats.org/presentationml/2006/main">
+  <p:cSld>
+    <p:spTree>
+      <p:nvGrpSpPr>
+        <p:cNvPr id="1" name=""/>
+        <p:cNvGrpSpPr/>
+        <p:nvPr/>
+      </p:nvGrpSpPr>
+      <p:grpSpPr>
+        <a:xfrm>
+          <a:off x="0" y="0"/>
+          <a:ext cx="0" cy="0"/>
+          <a:chOff x="0" y="0"/>
+          <a:chExt cx="0" cy="0"/>
+        </a:xfrm>
+      </p:grpSpPr>
+      <p:sp>
+        <p:nvSpPr>
+          <p:cNvPr id="2" name="Title 1"/>
+          <p:cNvSpPr>
+            <a:spLocks noGrp="1"/>
+          </p:cNvSpPr>
+          <p:nvPr>
+            <p:ph type="title"/>
+          </p:nvPr>
+        </p:nvSpPr>
+        <p:spPr/>
+        <p:txBody>
+          <a:bodyPr/>
+          <a:lstStyle/>
+          <a:p>
+            <a:r>
+              <a:rPr lang="en-US" dirty="0" smtClean="0"/>
+              <a:t>The Course Project</a:t>
+            </a:r>
+            <a:endParaRPr lang="en-ZA" dirty="0"/>
+          </a:p>
+        </p:txBody>
+      </p:sp>
+      <p:sp>
+        <p:nvSpPr>
+          <p:cNvPr id="3" name="Content Placeholder 2"/>
+          <p:cNvSpPr>
+            <a:spLocks noGrp="1"/>
+          </p:cNvSpPr>
+          <p:nvPr>
+            <p:ph idx="1"/>
+          </p:nvPr>
+        </p:nvSpPr>
+        <p:spPr>
+          <a:xfrm>
+            <a:off x="1089457" y="1429464"/>
+            <a:ext cx="8946541" cy="4195481"/>
+          </a:xfrm>
+        </p:spPr>
+        <p:txBody>
+          <a:bodyPr/>
+          <a:lstStyle/>
+          <a:p>
+            <a:r>
+              <a:rPr lang="en-US" dirty="0" smtClean="0"/>
+              <a:t>For this project, you will be building a simple web interface which can scan selected folders for media and store that information in a database</a:t>
+            </a:r>
+          </a:p>
+          <a:p>
+            <a:r>
+              <a:rPr lang="en-US" dirty="0" smtClean="0"/>
+              <a:t>This week build a simple </a:t>
+            </a:r>
+            <a:r>
+              <a:rPr lang="en-US" dirty="0" err="1" smtClean="0"/>
+              <a:t>NodeJS</a:t>
+            </a:r>
+            <a:r>
+              <a:rPr lang="en-US" dirty="0" smtClean="0"/>
+              <a:t> application which is able to use the console input library used with </a:t>
+            </a:r>
+            <a:r>
+              <a:rPr lang="en-US" dirty="0" err="1" smtClean="0"/>
+              <a:t>tictactoe</a:t>
+            </a:r>
+            <a:r>
+              <a:rPr lang="en-US" dirty="0" smtClean="0"/>
+              <a:t> “</a:t>
+            </a:r>
+            <a:r>
+              <a:rPr lang="en-US" dirty="0" err="1" smtClean="0"/>
+              <a:t>readline</a:t>
+            </a:r>
+            <a:r>
+              <a:rPr lang="en-US" dirty="0" smtClean="0"/>
+              <a:t>-sync”, to get a specific folder name.</a:t>
+            </a:r>
+          </a:p>
+          <a:p>
+            <a:r>
+              <a:rPr lang="en-US" dirty="0" smtClean="0"/>
+              <a:t>The program must then print the files in that folder to the console.</a:t>
+            </a:r>
+            <a:endParaRPr lang="en-ZA" dirty="0" smtClean="0"/>
+          </a:p>
+          <a:p>
+            <a:r>
+              <a:rPr lang="en-US" dirty="0" smtClean="0"/>
+              <a:t>Some Links</a:t>
+            </a:r>
+          </a:p>
+          <a:p>
+            <a:pPr lvl="1"/>
+            <a:r>
+              <a:rPr lang="en-US" dirty="0">
+                <a:hlinkClick r:id="rId2"/>
+              </a:rPr>
+              <a:t>https://</a:t>
+            </a:r>
+            <a:r>
+              <a:rPr lang="en-US" dirty="0" smtClean="0">
+                <a:hlinkClick r:id="rId2"/>
+              </a:rPr>
+              <a:t>www.npmjs.com/package/readline-sync</a:t>
+            </a:r>
+            <a:endParaRPr lang="en-US" dirty="0" smtClean="0"/>
+          </a:p>
+          <a:p>
+            <a:pPr lvl="1"/>
+            <a:r>
+              <a:rPr lang="en-US" dirty="0">
+                <a:hlinkClick r:id="rId3"/>
+              </a:rPr>
+              <a:t>http://</a:t>
+            </a:r>
+            <a:r>
+              <a:rPr lang="en-US" dirty="0" smtClean="0">
+                <a:hlinkClick r:id="rId3"/>
+              </a:rPr>
+              <a:t>stackoverflow.com/questions/2727167/getting-all-filenames-in-a-directory-with-node-js</a:t>
+            </a:r>
+            <a:endParaRPr lang="en-US" dirty="0" smtClean="0"/>
+          </a:p>
+          <a:p>
+            <a:pPr lvl="1"/>
+            <a:endParaRPr lang="en-US" dirty="0"/>
+          </a:p>
+        </p:txBody>
+      </p:sp>
+    </p:spTree>
+    <p:extLst>
+      <p:ext uri="{BB962C8B-B14F-4D97-AF65-F5344CB8AC3E}">
+        <p14:creationId xmlns:p14="http://schemas.microsoft.com/office/powerpoint/2010/main" val="1568503475"/>
+      </p:ext>
+    </p:extLst>
+  </p:cSld>
+  <p:clrMapOvr>
+    <a:masterClrMapping/>
+  </p:clrMapOvr>
+</p:sld>
+</file>
+
+<file path=ppt/slides/slide25.xml><?xml version="1.0" encoding="utf-8"?>
+<p:sld xmlns:a="http://schemas.openxmlformats.org/drawingml/2006/main" xmlns:r="http://schemas.openxmlformats.org/officeDocument/2006/relationships" xmlns:p="http://schemas.openxmlformats.org/presentationml/2006/main">
+  <p:cSld>
+    <p:spTree>
+      <p:nvGrpSpPr>
+        <p:cNvPr id="1" name=""/>
+        <p:cNvGrpSpPr/>
+        <p:nvPr/>
+      </p:nvGrpSpPr>
+      <p:grpSpPr>
+        <a:xfrm>
+          <a:off x="0" y="0"/>
+          <a:ext cx="0" cy="0"/>
+          <a:chOff x="0" y="0"/>
+          <a:chExt cx="0" cy="0"/>
+        </a:xfrm>
+      </p:grpSpPr>
+      <p:sp>
+        <p:nvSpPr>
+          <p:cNvPr id="2" name="Title 1"/>
+          <p:cNvSpPr>
+            <a:spLocks noGrp="1"/>
+          </p:cNvSpPr>
+          <p:nvPr>
+            <p:ph type="title"/>
+          </p:nvPr>
+        </p:nvSpPr>
+        <p:spPr/>
+        <p:txBody>
+          <a:bodyPr/>
+          <a:lstStyle/>
+          <a:p>
+            <a:r>
+              <a:rPr lang="en-US" dirty="0" smtClean="0"/>
+              <a:t>The Course Project</a:t>
+            </a:r>
+            <a:endParaRPr lang="en-ZA" dirty="0"/>
+          </a:p>
+        </p:txBody>
+      </p:sp>
+      <p:sp>
+        <p:nvSpPr>
+          <p:cNvPr id="3" name="Content Placeholder 2"/>
+          <p:cNvSpPr>
+            <a:spLocks noGrp="1"/>
+          </p:cNvSpPr>
+          <p:nvPr>
+            <p:ph idx="1"/>
+          </p:nvPr>
+        </p:nvSpPr>
+        <p:spPr>
+          <a:xfrm>
+            <a:off x="1089457" y="1429464"/>
+            <a:ext cx="8946541" cy="4195481"/>
+          </a:xfrm>
+        </p:spPr>
+        <p:txBody>
+          <a:bodyPr/>
+          <a:lstStyle/>
+          <a:p>
+            <a:r>
+              <a:rPr lang="en-US" dirty="0" smtClean="0"/>
+              <a:t>Next session we will cover how to build tests which we will incorporate into our program</a:t>
+            </a:r>
+          </a:p>
+          <a:p>
+            <a:r>
+              <a:rPr lang="en-US" dirty="0" smtClean="0"/>
+              <a:t>Make sure to make the program modular</a:t>
+            </a:r>
+          </a:p>
+          <a:p>
+            <a:r>
+              <a:rPr lang="en-US" dirty="0" smtClean="0"/>
+              <a:t>We will build an interface at the end of the course</a:t>
+            </a:r>
+          </a:p>
+          <a:p>
+            <a:endParaRPr lang="en-US" dirty="0" smtClean="0"/>
+          </a:p>
+          <a:p>
+            <a:endParaRPr lang="en-US" dirty="0" smtClean="0"/>
+          </a:p>
+          <a:p>
+            <a:pPr lvl="1"/>
+            <a:endParaRPr lang="en-US" dirty="0"/>
+          </a:p>
+        </p:txBody>
+      </p:sp>
+    </p:spTree>
+    <p:extLst>
+      <p:ext uri="{BB962C8B-B14F-4D97-AF65-F5344CB8AC3E}">
+        <p14:creationId xmlns:p14="http://schemas.microsoft.com/office/powerpoint/2010/main" val="2182409356"/>
+      </p:ext>
+    </p:extLst>
+  </p:cSld>
+  <p:clrMapOvr>
+    <a:masterClrMapping/>
+  </p:clrMapOvr>
+</p:sld>
+</file>
+
+<file path=ppt/slides/slide26.xml><?xml version="1.0" encoding="utf-8"?>
 <p:sld xmlns:a="http://schemas.openxmlformats.org/drawingml/2006/main" xmlns:r="http://schemas.openxmlformats.org/officeDocument/2006/relationships" xmlns:p="http://schemas.openxmlformats.org/presentationml/2006/main">
   <p:cSld>
     <p:spTree>
@@ -8174,7 +9087,7 @@
         </p:nvSpPr>
         <p:spPr>
           <a:xfrm>
-            <a:off x="2351584" y="1196753"/>
+            <a:off x="495075" y="1958753"/>
             <a:ext cx="3677032" cy="3579849"/>
           </a:xfrm>
         </p:spPr>
@@ -8269,7 +9182,7 @@
         </p:blipFill>
         <p:spPr bwMode="auto">
           <a:xfrm>
-            <a:off x="6203504" y="692696"/>
+            <a:off x="4402413" y="1428962"/>
             <a:ext cx="4464496" cy="4320480"/>
           </a:xfrm>
           <a:prstGeom prst="rect">
@@ -8310,7 +9223,7 @@
         </p:blipFill>
         <p:spPr bwMode="auto">
           <a:xfrm>
-            <a:off x="8688288" y="5278388"/>
+            <a:off x="8952657" y="4309282"/>
             <a:ext cx="1440160" cy="1440160"/>
           </a:xfrm>
           <a:prstGeom prst="rect">
@@ -8328,6 +9241,34 @@
           </a:extLst>
         </p:spPr>
       </p:pic>
+      <p:sp>
+        <p:nvSpPr>
+          <p:cNvPr id="4" name="Rectangle 3"/>
+          <p:cNvSpPr/>
+          <p:nvPr/>
+        </p:nvSpPr>
+        <p:spPr>
+          <a:xfrm>
+            <a:off x="4402413" y="6144538"/>
+            <a:ext cx="7316866" cy="369332"/>
+          </a:xfrm>
+          <a:prstGeom prst="rect">
+            <a:avLst/>
+          </a:prstGeom>
+        </p:spPr>
+        <p:txBody>
+          <a:bodyPr wrap="square">
+            <a:spAutoFit/>
+          </a:bodyPr>
+          <a:lstStyle/>
+          <a:p>
+            <a:r>
+              <a:rPr lang="en-ZA" dirty="0"/>
+              <a:t>https://en.wikipedia.org/wiki/Systems_development_life_cycle</a:t>
+            </a:r>
+          </a:p>
+        </p:txBody>
+      </p:sp>
     </p:spTree>
     <p:extLst>
       <p:ext uri="{BB962C8B-B14F-4D97-AF65-F5344CB8AC3E}">
@@ -8391,7 +9332,12 @@
             <p:ph idx="1"/>
           </p:nvPr>
         </p:nvSpPr>
-        <p:spPr/>
+        <p:spPr>
+          <a:xfrm>
+            <a:off x="562985" y="1623427"/>
+            <a:ext cx="7626718" cy="4195481"/>
+          </a:xfrm>
+        </p:spPr>
         <p:txBody>
           <a:bodyPr/>
           <a:lstStyle/>
@@ -8467,7 +9413,7 @@
         </p:blipFill>
         <p:spPr bwMode="auto">
           <a:xfrm>
-            <a:off x="4223792" y="2940911"/>
+            <a:off x="7774066" y="1762175"/>
             <a:ext cx="4104456" cy="3890480"/>
           </a:xfrm>
           <a:prstGeom prst="rect">
@@ -8550,7 +9496,7 @@
         </p:nvSpPr>
         <p:spPr>
           <a:xfrm>
-            <a:off x="6168008" y="1100629"/>
+            <a:off x="6625208" y="1987294"/>
             <a:ext cx="4032448" cy="3579849"/>
           </a:xfrm>
         </p:spPr>
@@ -8675,7 +9621,7 @@
         </p:blipFill>
         <p:spPr bwMode="auto">
           <a:xfrm>
-            <a:off x="1631505" y="1140768"/>
+            <a:off x="994196" y="2179859"/>
             <a:ext cx="4259627" cy="3194720"/>
           </a:xfrm>
           <a:prstGeom prst="rect">
@@ -8758,7 +9704,7 @@
         </p:nvSpPr>
         <p:spPr>
           <a:xfrm>
-            <a:off x="2346960" y="1100628"/>
+            <a:off x="1377142" y="1682519"/>
             <a:ext cx="7520940" cy="3768532"/>
           </a:xfrm>
         </p:spPr>
@@ -8952,7 +9898,7 @@
         </p:nvSpPr>
         <p:spPr>
           <a:xfrm>
-            <a:off x="2346960" y="1100629"/>
+            <a:off x="1404851" y="1779501"/>
             <a:ext cx="3172976" cy="3579849"/>
           </a:xfrm>
         </p:spPr>
@@ -9015,7 +9961,7 @@
         </p:blipFill>
         <p:spPr bwMode="auto">
           <a:xfrm>
-            <a:off x="5807969" y="703071"/>
+            <a:off x="5932659" y="1728307"/>
             <a:ext cx="4144353" cy="3175896"/>
           </a:xfrm>
           <a:prstGeom prst="rect">
@@ -9103,7 +10049,12 @@
             <p:ph idx="1"/>
           </p:nvPr>
         </p:nvSpPr>
-        <p:spPr/>
+        <p:spPr>
+          <a:xfrm>
+            <a:off x="1075603" y="1803536"/>
+            <a:ext cx="8946541" cy="4195481"/>
+          </a:xfrm>
+        </p:spPr>
         <p:txBody>
           <a:bodyPr/>
           <a:lstStyle/>
@@ -9272,7 +10223,7 @@
         </p:nvSpPr>
         <p:spPr>
           <a:xfrm>
-            <a:off x="6023992" y="743682"/>
+            <a:off x="6023992" y="525573"/>
             <a:ext cx="3987924" cy="3579849"/>
           </a:xfrm>
         </p:spPr>
@@ -9410,7 +10361,7 @@
         </p:blipFill>
         <p:spPr bwMode="auto">
           <a:xfrm>
-            <a:off x="2012976" y="908721"/>
+            <a:off x="1042145" y="1519694"/>
             <a:ext cx="3592467" cy="2065171"/>
           </a:xfrm>
           <a:prstGeom prst="rect">
@@ -9451,7 +10402,7 @@
         </p:blipFill>
         <p:spPr bwMode="auto">
           <a:xfrm>
-            <a:off x="2415768" y="2973892"/>
+            <a:off x="1444939" y="3902147"/>
             <a:ext cx="2786881" cy="2088303"/>
           </a:xfrm>
           <a:prstGeom prst="rect">
@@ -9477,7 +10428,7 @@
         </p:nvSpPr>
         <p:spPr>
           <a:xfrm>
-            <a:off x="6023992" y="3584866"/>
+            <a:off x="6023992" y="4323530"/>
             <a:ext cx="4464496" cy="1477328"/>
           </a:xfrm>
           <a:prstGeom prst="rect">
@@ -9525,7 +10476,6 @@
               <a:rPr lang="en-ZA" dirty="0"/>
               <a:t>Revise and Enhance the Prototype</a:t>
             </a:r>
-            <a:endParaRPr lang="en-ZA" dirty="0"/>
           </a:p>
         </p:txBody>
       </p:sp>
@@ -9537,7 +10487,7 @@
         </p:nvCxnSpPr>
         <p:spPr>
           <a:xfrm>
-            <a:off x="5605442" y="3584866"/>
+            <a:off x="5814717" y="4125193"/>
             <a:ext cx="4883046" cy="0"/>
           </a:xfrm>
           <a:prstGeom prst="straightConnector1">
@@ -9840,7 +10790,7 @@
   <a:extraClrSchemeLst/>
   <a:extLst>
     <a:ext uri="{05A4C25C-085E-4340-85A3-A5531E510DB2}">
-      <thm15:themeFamily xmlns:thm15="http://schemas.microsoft.com/office/thememl/2012/main" name="Ion" id="{B8441ADB-2E43-4AF7-B97A-BD870242C6A8}" vid="{A207AED3-9ABC-4A18-9978-A59B65688B15}"/>
+      <thm15:themeFamily xmlns:thm15="http://schemas.microsoft.com/office/thememl/2012/main" xmlns="" name="Ion" id="{B8441ADB-2E43-4AF7-B97A-BD870242C6A8}" vid="{A207AED3-9ABC-4A18-9978-A59B65688B15}"/>
     </a:ext>
   </a:extLst>
 </a:theme>

</xml_diff>

<commit_message>
made proper layer arch
</commit_message>
<xml_diff>
--- a/Session 2/Softdev Session 2 2016.pptx
+++ b/Session 2/Softdev Session 2 2016.pptx
@@ -24,9 +24,9 @@
     <p:sldId id="303" r:id="rId18"/>
     <p:sldId id="301" r:id="rId19"/>
     <p:sldId id="304" r:id="rId20"/>
-    <p:sldId id="309" r:id="rId21"/>
-    <p:sldId id="302" r:id="rId22"/>
-    <p:sldId id="305" r:id="rId23"/>
+    <p:sldId id="302" r:id="rId21"/>
+    <p:sldId id="305" r:id="rId22"/>
+    <p:sldId id="309" r:id="rId23"/>
     <p:sldId id="306" r:id="rId24"/>
     <p:sldId id="307" r:id="rId25"/>
     <p:sldId id="308" r:id="rId26"/>
@@ -131,7 +131,7 @@
   </p:defaultTextStyle>
   <p:extLst>
     <p:ext uri="{EFAFB233-063F-42B5-8137-9DF3F51BA10A}">
-      <p15:sldGuideLst xmlns:p15="http://schemas.microsoft.com/office/powerpoint/2012/main" xmlns="">
+      <p15:sldGuideLst xmlns="" xmlns:p15="http://schemas.microsoft.com/office/powerpoint/2012/main">
         <p15:guide id="1" orient="horz" pos="2160">
           <p15:clr>
             <a:srgbClr val="A4A3A4"/>
@@ -334,7 +334,7 @@
           <a:p>
             <a:fld id="{FBDF5932-50BA-4683-BD71-901965AADFF2}" type="datetimeFigureOut">
               <a:rPr lang="en-ZA" smtClean="0"/>
-              <a:t>2016-09-12</a:t>
+              <a:t>2016-09-14</a:t>
             </a:fld>
             <a:endParaRPr lang="en-ZA"/>
           </a:p>
@@ -609,7 +609,7 @@
           <a:p>
             <a:fld id="{FBDF5932-50BA-4683-BD71-901965AADFF2}" type="datetimeFigureOut">
               <a:rPr lang="en-ZA" smtClean="0"/>
-              <a:t>2016-09-12</a:t>
+              <a:t>2016-09-14</a:t>
             </a:fld>
             <a:endParaRPr lang="en-ZA"/>
           </a:p>
@@ -803,7 +803,7 @@
           <a:p>
             <a:fld id="{FBDF5932-50BA-4683-BD71-901965AADFF2}" type="datetimeFigureOut">
               <a:rPr lang="en-ZA" smtClean="0"/>
-              <a:t>2016-09-12</a:t>
+              <a:t>2016-09-14</a:t>
             </a:fld>
             <a:endParaRPr lang="en-ZA"/>
           </a:p>
@@ -1074,7 +1074,7 @@
           <a:p>
             <a:fld id="{FBDF5932-50BA-4683-BD71-901965AADFF2}" type="datetimeFigureOut">
               <a:rPr lang="en-ZA" smtClean="0"/>
-              <a:t>2016-09-12</a:t>
+              <a:t>2016-09-14</a:t>
             </a:fld>
             <a:endParaRPr lang="en-ZA"/>
           </a:p>
@@ -1401,7 +1401,7 @@
           <a:p>
             <a:fld id="{FBDF5932-50BA-4683-BD71-901965AADFF2}" type="datetimeFigureOut">
               <a:rPr lang="en-ZA" smtClean="0"/>
-              <a:t>2016-09-12</a:t>
+              <a:t>2016-09-14</a:t>
             </a:fld>
             <a:endParaRPr lang="en-ZA"/>
           </a:p>
@@ -2020,7 +2020,7 @@
           <a:p>
             <a:fld id="{FBDF5932-50BA-4683-BD71-901965AADFF2}" type="datetimeFigureOut">
               <a:rPr lang="en-ZA" smtClean="0"/>
-              <a:t>2016-09-12</a:t>
+              <a:t>2016-09-14</a:t>
             </a:fld>
             <a:endParaRPr lang="en-ZA"/>
           </a:p>
@@ -2867,7 +2867,7 @@
           <a:p>
             <a:fld id="{FBDF5932-50BA-4683-BD71-901965AADFF2}" type="datetimeFigureOut">
               <a:rPr lang="en-ZA" smtClean="0"/>
-              <a:t>2016-09-12</a:t>
+              <a:t>2016-09-14</a:t>
             </a:fld>
             <a:endParaRPr lang="en-ZA"/>
           </a:p>
@@ -3037,7 +3037,7 @@
           <a:p>
             <a:fld id="{FBDF5932-50BA-4683-BD71-901965AADFF2}" type="datetimeFigureOut">
               <a:rPr lang="en-ZA" smtClean="0"/>
-              <a:t>2016-09-12</a:t>
+              <a:t>2016-09-14</a:t>
             </a:fld>
             <a:endParaRPr lang="en-ZA"/>
           </a:p>
@@ -3217,7 +3217,7 @@
           <a:p>
             <a:fld id="{FBDF5932-50BA-4683-BD71-901965AADFF2}" type="datetimeFigureOut">
               <a:rPr lang="en-ZA" smtClean="0"/>
-              <a:t>2016-09-12</a:t>
+              <a:t>2016-09-14</a:t>
             </a:fld>
             <a:endParaRPr lang="en-ZA"/>
           </a:p>
@@ -3387,7 +3387,7 @@
           <a:p>
             <a:fld id="{FBDF5932-50BA-4683-BD71-901965AADFF2}" type="datetimeFigureOut">
               <a:rPr lang="en-ZA" smtClean="0"/>
-              <a:t>2016-09-12</a:t>
+              <a:t>2016-09-14</a:t>
             </a:fld>
             <a:endParaRPr lang="en-ZA"/>
           </a:p>
@@ -3634,7 +3634,7 @@
           <a:p>
             <a:fld id="{FBDF5932-50BA-4683-BD71-901965AADFF2}" type="datetimeFigureOut">
               <a:rPr lang="en-ZA" smtClean="0"/>
-              <a:t>2016-09-12</a:t>
+              <a:t>2016-09-14</a:t>
             </a:fld>
             <a:endParaRPr lang="en-ZA"/>
           </a:p>
@@ -3926,7 +3926,7 @@
           <a:p>
             <a:fld id="{FBDF5932-50BA-4683-BD71-901965AADFF2}" type="datetimeFigureOut">
               <a:rPr lang="en-ZA" smtClean="0"/>
-              <a:t>2016-09-12</a:t>
+              <a:t>2016-09-14</a:t>
             </a:fld>
             <a:endParaRPr lang="en-ZA"/>
           </a:p>
@@ -4370,7 +4370,7 @@
           <a:p>
             <a:fld id="{FBDF5932-50BA-4683-BD71-901965AADFF2}" type="datetimeFigureOut">
               <a:rPr lang="en-ZA" smtClean="0"/>
-              <a:t>2016-09-12</a:t>
+              <a:t>2016-09-14</a:t>
             </a:fld>
             <a:endParaRPr lang="en-ZA"/>
           </a:p>
@@ -4488,7 +4488,7 @@
           <a:p>
             <a:fld id="{FBDF5932-50BA-4683-BD71-901965AADFF2}" type="datetimeFigureOut">
               <a:rPr lang="en-ZA" smtClean="0"/>
-              <a:t>2016-09-12</a:t>
+              <a:t>2016-09-14</a:t>
             </a:fld>
             <a:endParaRPr lang="en-ZA"/>
           </a:p>
@@ -4583,7 +4583,7 @@
           <a:p>
             <a:fld id="{FBDF5932-50BA-4683-BD71-901965AADFF2}" type="datetimeFigureOut">
               <a:rPr lang="en-ZA" smtClean="0"/>
-              <a:t>2016-09-12</a:t>
+              <a:t>2016-09-14</a:t>
             </a:fld>
             <a:endParaRPr lang="en-ZA"/>
           </a:p>
@@ -4862,7 +4862,7 @@
           <a:p>
             <a:fld id="{FBDF5932-50BA-4683-BD71-901965AADFF2}" type="datetimeFigureOut">
               <a:rPr lang="en-ZA" smtClean="0"/>
-              <a:t>2016-09-12</a:t>
+              <a:t>2016-09-14</a:t>
             </a:fld>
             <a:endParaRPr lang="en-ZA"/>
           </a:p>
@@ -5137,7 +5137,7 @@
           <a:p>
             <a:fld id="{FBDF5932-50BA-4683-BD71-901965AADFF2}" type="datetimeFigureOut">
               <a:rPr lang="en-ZA" smtClean="0"/>
-              <a:t>2016-09-12</a:t>
+              <a:t>2016-09-14</a:t>
             </a:fld>
             <a:endParaRPr lang="en-ZA"/>
           </a:p>
@@ -5560,7 +5560,7 @@
           <a:p>
             <a:fld id="{FBDF5932-50BA-4683-BD71-901965AADFF2}" type="datetimeFigureOut">
               <a:rPr lang="en-ZA" smtClean="0"/>
-              <a:t>2016-09-12</a:t>
+              <a:t>2016-09-14</a:t>
             </a:fld>
             <a:endParaRPr lang="en-ZA"/>
           </a:p>
@@ -6411,7 +6411,12 @@
             <p:ph idx="1"/>
           </p:nvPr>
         </p:nvSpPr>
-        <p:spPr/>
+        <p:spPr>
+          <a:xfrm>
+            <a:off x="1075603" y="1484881"/>
+            <a:ext cx="8946541" cy="4195481"/>
+          </a:xfrm>
+        </p:spPr>
         <p:txBody>
           <a:bodyPr>
             <a:normAutofit fontScale="77500" lnSpcReduction="20000"/>
@@ -6574,7 +6579,6 @@
               <a:rPr lang="en-ZA" dirty="0"/>
               <a:t>https://en.wikipedia.org/wiki/Agile_software_development</a:t>
             </a:r>
-            <a:endParaRPr lang="en-ZA" dirty="0"/>
           </a:p>
         </p:txBody>
       </p:sp>
@@ -6872,7 +6876,6 @@
               <a:rPr lang="en-ZA" dirty="0" smtClean="0"/>
               <a:t>Team Member</a:t>
             </a:r>
-            <a:endParaRPr lang="en-ZA" dirty="0" smtClean="0"/>
           </a:p>
           <a:p>
             <a:pPr lvl="1">
@@ -6993,12 +6996,12 @@
         <p:spPr>
           <a:xfrm>
             <a:off x="1047950" y="1470552"/>
-            <a:ext cx="4397112" cy="3579849"/>
+            <a:ext cx="4397112" cy="5041084"/>
           </a:xfrm>
         </p:spPr>
         <p:txBody>
           <a:bodyPr>
-            <a:normAutofit fontScale="62500" lnSpcReduction="20000"/>
+            <a:noAutofit/>
           </a:bodyPr>
           <a:lstStyle/>
           <a:p>
@@ -7007,7 +7010,7 @@
               <a:buChar char="•"/>
             </a:pPr>
             <a:r>
-              <a:rPr lang="en-ZA" dirty="0" smtClean="0"/>
+              <a:rPr lang="en-ZA" sz="1600" dirty="0" smtClean="0"/>
               <a:t>Windows XP = Extreme Programming</a:t>
             </a:r>
           </a:p>
@@ -7017,7 +7020,7 @@
               <a:buChar char="•"/>
             </a:pPr>
             <a:r>
-              <a:rPr lang="en-ZA" dirty="0" smtClean="0"/>
+              <a:rPr lang="en-ZA" sz="1600" dirty="0" smtClean="0"/>
               <a:t>Improve software quality</a:t>
             </a:r>
           </a:p>
@@ -7027,7 +7030,7 @@
               <a:buChar char="•"/>
             </a:pPr>
             <a:r>
-              <a:rPr lang="en-ZA" dirty="0" smtClean="0"/>
+              <a:rPr lang="en-ZA" sz="1600" dirty="0" smtClean="0"/>
               <a:t>Frequent development releases</a:t>
             </a:r>
           </a:p>
@@ -7037,7 +7040,7 @@
               <a:buChar char="•"/>
             </a:pPr>
             <a:r>
-              <a:rPr lang="en-ZA" dirty="0" smtClean="0"/>
+              <a:rPr lang="en-ZA" sz="1600" dirty="0" smtClean="0"/>
               <a:t>Short development cycles</a:t>
             </a:r>
           </a:p>
@@ -7047,7 +7050,7 @@
               <a:buChar char="•"/>
             </a:pPr>
             <a:r>
-              <a:rPr lang="en-ZA" dirty="0" smtClean="0"/>
+              <a:rPr lang="en-ZA" sz="1600" dirty="0" smtClean="0"/>
               <a:t>Improve productivity</a:t>
             </a:r>
           </a:p>
@@ -7057,7 +7060,7 @@
               <a:buChar char="•"/>
             </a:pPr>
             <a:r>
-              <a:rPr lang="en-ZA" dirty="0" smtClean="0"/>
+              <a:rPr lang="en-ZA" sz="1600" dirty="0" smtClean="0"/>
               <a:t>Checkpoints where new requirements can be adopted</a:t>
             </a:r>
           </a:p>
@@ -7067,7 +7070,7 @@
               <a:buChar char="•"/>
             </a:pPr>
             <a:r>
-              <a:rPr lang="en-ZA" dirty="0" smtClean="0"/>
+              <a:rPr lang="en-ZA" sz="1600" dirty="0" smtClean="0"/>
               <a:t>90’s era – early 00’s</a:t>
             </a:r>
           </a:p>
@@ -7077,7 +7080,7 @@
               <a:buChar char="•"/>
             </a:pPr>
             <a:r>
-              <a:rPr lang="en-ZA" dirty="0" smtClean="0"/>
+              <a:rPr lang="en-ZA" sz="1600" dirty="0" smtClean="0"/>
               <a:t>Adoption has fallen</a:t>
             </a:r>
           </a:p>
@@ -7087,7 +7090,7 @@
               <a:buChar char="•"/>
             </a:pPr>
             <a:r>
-              <a:rPr lang="en-ZA" dirty="0" smtClean="0"/>
+              <a:rPr lang="en-ZA" sz="1600" dirty="0" smtClean="0"/>
               <a:t>High discipline is required</a:t>
             </a:r>
           </a:p>
@@ -7107,7 +7110,7 @@
               <a:buChar char="•"/>
             </a:pPr>
             <a:r>
-              <a:rPr lang="en-ZA" dirty="0" smtClean="0"/>
+              <a:rPr lang="en-ZA" sz="1600" dirty="0" smtClean="0"/>
               <a:t>Has evolved</a:t>
             </a:r>
           </a:p>
@@ -7117,7 +7120,7 @@
               <a:buChar char="•"/>
             </a:pPr>
             <a:r>
-              <a:rPr lang="en-ZA" dirty="0" smtClean="0"/>
+              <a:rPr lang="en-ZA" sz="1600" dirty="0" smtClean="0"/>
               <a:t>Paired Programming</a:t>
             </a:r>
           </a:p>
@@ -7126,7 +7129,7 @@
               <a:buFont typeface="Arial" panose="020B0604020202020204" pitchFamily="34" charset="0"/>
               <a:buChar char="•"/>
             </a:pPr>
-            <a:endParaRPr lang="en-ZA" dirty="0"/>
+            <a:endParaRPr lang="en-ZA" sz="1600" dirty="0"/>
           </a:p>
         </p:txBody>
       </p:sp>
@@ -7235,7 +7238,12 @@
             <p:ph idx="1"/>
           </p:nvPr>
         </p:nvSpPr>
-        <p:spPr/>
+        <p:spPr>
+          <a:xfrm>
+            <a:off x="1117166" y="1581863"/>
+            <a:ext cx="8946541" cy="4195481"/>
+          </a:xfrm>
+        </p:spPr>
         <p:txBody>
           <a:bodyPr>
             <a:normAutofit lnSpcReduction="10000"/>
@@ -7298,15 +7306,36 @@
             </a:pPr>
             <a:r>
               <a:rPr lang="en-ZA" dirty="0" smtClean="0"/>
-              <a:t>The observer also focuses on the strategic direction of the work whilst the driver focuses on the specifics of the code</a:t>
-            </a:r>
+              <a:t>The observer also focuses on the strategic direction of the work whilst the driver focuses on the specifics of the </a:t>
+            </a:r>
+            <a:r>
+              <a:rPr lang="en-ZA" dirty="0" smtClean="0"/>
+              <a:t>code</a:t>
+            </a:r>
+          </a:p>
+          <a:p>
+            <a:pPr marL="0" indent="0">
+              <a:buNone/>
+            </a:pPr>
+            <a:endParaRPr lang="en-ZA" dirty="0" smtClean="0"/>
           </a:p>
           <a:p>
             <a:pPr>
               <a:buFont typeface="Arial" panose="020B0604020202020204" pitchFamily="34" charset="0"/>
               <a:buChar char="•"/>
             </a:pPr>
-            <a:endParaRPr lang="en-ZA" dirty="0"/>
+            <a:r>
+              <a:rPr lang="en-ZA" dirty="0" smtClean="0"/>
+              <a:t>Helps </a:t>
+            </a:r>
+            <a:r>
+              <a:rPr lang="en-ZA" dirty="0" smtClean="0"/>
+              <a:t>with </a:t>
+            </a:r>
+            <a:r>
+              <a:rPr lang="en-ZA" dirty="0" smtClean="0"/>
+              <a:t>morale</a:t>
+            </a:r>
           </a:p>
           <a:p>
             <a:pPr>
@@ -7314,18 +7343,8 @@
               <a:buChar char="•"/>
             </a:pPr>
             <a:r>
-              <a:rPr lang="en-ZA" dirty="0" smtClean="0"/>
-              <a:t>Personally I have been involved in this kind of methodology with success</a:t>
-            </a:r>
-          </a:p>
-          <a:p>
-            <a:pPr>
-              <a:buFont typeface="Arial" panose="020B0604020202020204" pitchFamily="34" charset="0"/>
-              <a:buChar char="•"/>
-            </a:pPr>
-            <a:r>
-              <a:rPr lang="en-ZA" dirty="0" smtClean="0"/>
-              <a:t>Helps with morale</a:t>
+              <a:rPr lang="en-US" dirty="0" smtClean="0"/>
+              <a:t>Reduced the potential of the development team as two members work on the same set of code rather than working in parallel.</a:t>
             </a:r>
             <a:endParaRPr lang="en-ZA" dirty="0"/>
           </a:p>
@@ -7394,9 +7413,16 @@
             <p:ph idx="1"/>
           </p:nvPr>
         </p:nvSpPr>
-        <p:spPr/>
-        <p:txBody>
-          <a:bodyPr/>
+        <p:spPr>
+          <a:xfrm>
+            <a:off x="1089458" y="1540300"/>
+            <a:ext cx="8946541" cy="4195481"/>
+          </a:xfrm>
+        </p:spPr>
+        <p:txBody>
+          <a:bodyPr>
+            <a:normAutofit lnSpcReduction="10000"/>
+          </a:bodyPr>
           <a:lstStyle/>
           <a:p>
             <a:pPr>
@@ -7425,7 +7451,15 @@
             </a:pPr>
             <a:r>
               <a:rPr lang="en-ZA" dirty="0" smtClean="0"/>
-              <a:t>Code is the implemented to pass those tests</a:t>
+              <a:t>Code is </a:t>
+            </a:r>
+            <a:r>
+              <a:rPr lang="en-ZA" dirty="0" smtClean="0"/>
+              <a:t>then </a:t>
+            </a:r>
+            <a:r>
+              <a:rPr lang="en-ZA" dirty="0" smtClean="0"/>
+              <a:t>implemented to pass those tests</a:t>
             </a:r>
           </a:p>
           <a:p>
@@ -7445,8 +7479,18 @@
             </a:pPr>
             <a:r>
               <a:rPr lang="en-ZA" dirty="0" smtClean="0"/>
-              <a:t>Makes sure the business rules come first</a:t>
-            </a:r>
+              <a:t>Makes sure the business rules come </a:t>
+            </a:r>
+            <a:r>
+              <a:rPr lang="en-ZA" dirty="0" smtClean="0"/>
+              <a:t>first</a:t>
+            </a:r>
+          </a:p>
+          <a:p>
+            <a:pPr marL="0" indent="0">
+              <a:buNone/>
+            </a:pPr>
+            <a:endParaRPr lang="en-ZA" dirty="0" smtClean="0"/>
           </a:p>
           <a:p>
             <a:pPr>
@@ -7473,6 +7517,10 @@
               <a:buFont typeface="Arial" panose="020B0604020202020204" pitchFamily="34" charset="0"/>
               <a:buChar char="•"/>
             </a:pPr>
+            <a:r>
+              <a:rPr lang="en-US" dirty="0" smtClean="0"/>
+              <a:t>May cause the system to become too strict and unable to adapt and change.</a:t>
+            </a:r>
             <a:endParaRPr lang="en-ZA" dirty="0"/>
           </a:p>
         </p:txBody>
@@ -7524,7 +7572,11 @@
           <a:p>
             <a:r>
               <a:rPr lang="en-ZA" dirty="0" smtClean="0"/>
-              <a:t>Some Code Models</a:t>
+              <a:t>Some </a:t>
+            </a:r>
+            <a:r>
+              <a:rPr lang="en-ZA" dirty="0" smtClean="0"/>
+              <a:t>System Models</a:t>
             </a:r>
             <a:endParaRPr lang="en-ZA" dirty="0"/>
           </a:p>
@@ -7559,11 +7611,7 @@
           <a:p>
             <a:r>
               <a:rPr lang="en-ZA" dirty="0" smtClean="0"/>
-              <a:t>We will only speak about a </a:t>
-            </a:r>
-            <a:r>
-              <a:rPr lang="en-ZA" dirty="0" smtClean="0"/>
-              <a:t>few models</a:t>
+              <a:t>We will only speak about a few models</a:t>
             </a:r>
           </a:p>
           <a:p>
@@ -7577,7 +7625,18 @@
             <a:pPr lvl="1"/>
             <a:r>
               <a:rPr lang="en-US" dirty="0" smtClean="0"/>
-              <a:t>Event Driven Model</a:t>
+              <a:t>Event Driven </a:t>
+            </a:r>
+            <a:r>
+              <a:rPr lang="en-US" dirty="0" smtClean="0"/>
+              <a:t>Model</a:t>
+            </a:r>
+          </a:p>
+          <a:p>
+            <a:pPr lvl="1"/>
+            <a:r>
+              <a:rPr lang="en-US" dirty="0" smtClean="0"/>
+              <a:t>Modules</a:t>
             </a:r>
             <a:endParaRPr lang="en-ZA" dirty="0"/>
           </a:p>
@@ -7667,11 +7726,7 @@
             </a:pPr>
             <a:r>
               <a:rPr lang="en-ZA" dirty="0" smtClean="0"/>
-              <a:t>This allows black box </a:t>
-            </a:r>
-            <a:r>
-              <a:rPr lang="en-ZA" dirty="0" smtClean="0"/>
-              <a:t>design</a:t>
+              <a:t>This allows black box design</a:t>
             </a:r>
           </a:p>
           <a:p>
@@ -7688,7 +7743,11 @@
             </a:pPr>
             <a:r>
               <a:rPr lang="en-US" dirty="0" smtClean="0"/>
-              <a:t>RESTful API</a:t>
+              <a:t>RESTful </a:t>
+            </a:r>
+            <a:r>
+              <a:rPr lang="en-US" dirty="0" smtClean="0"/>
+              <a:t>API</a:t>
             </a:r>
           </a:p>
           <a:p>
@@ -7696,10 +7755,200 @@
               <a:buFont typeface="Arial" panose="020B0604020202020204" pitchFamily="34" charset="0"/>
               <a:buChar char="•"/>
             </a:pPr>
+            <a:endParaRPr lang="en-US" dirty="0"/>
+          </a:p>
+          <a:p>
+            <a:pPr>
+              <a:buFont typeface="Arial" panose="020B0604020202020204" pitchFamily="34" charset="0"/>
+              <a:buChar char="•"/>
+            </a:pPr>
+            <a:r>
+              <a:rPr lang="en-US" dirty="0" smtClean="0"/>
+              <a:t>Can be web</a:t>
+            </a:r>
+          </a:p>
+          <a:p>
+            <a:pPr>
+              <a:buFont typeface="Arial" panose="020B0604020202020204" pitchFamily="34" charset="0"/>
+              <a:buChar char="•"/>
+            </a:pPr>
+            <a:r>
+              <a:rPr lang="en-US" dirty="0" smtClean="0"/>
+              <a:t>Or a file</a:t>
+            </a:r>
+          </a:p>
+          <a:p>
+            <a:pPr>
+              <a:buFont typeface="Arial" panose="020B0604020202020204" pitchFamily="34" charset="0"/>
+              <a:buChar char="•"/>
+            </a:pPr>
+            <a:r>
+              <a:rPr lang="en-US" dirty="0" smtClean="0"/>
+              <a:t>Or any form of message passing</a:t>
+            </a:r>
+            <a:endParaRPr lang="en-US" dirty="0" smtClean="0"/>
+          </a:p>
+          <a:p>
+            <a:pPr>
+              <a:buFont typeface="Arial" panose="020B0604020202020204" pitchFamily="34" charset="0"/>
+              <a:buChar char="•"/>
+            </a:pPr>
             <a:endParaRPr lang="en-ZA" dirty="0"/>
           </a:p>
         </p:txBody>
       </p:sp>
+      <p:sp>
+        <p:nvSpPr>
+          <p:cNvPr id="4" name="Rectangle 3"/>
+          <p:cNvSpPr/>
+          <p:nvPr/>
+        </p:nvSpPr>
+        <p:spPr>
+          <a:xfrm>
+            <a:off x="4634345" y="3539838"/>
+            <a:ext cx="2563091" cy="2563091"/>
+          </a:xfrm>
+          <a:prstGeom prst="rect">
+            <a:avLst/>
+          </a:prstGeom>
+          <a:ln w="76200"/>
+        </p:spPr>
+        <p:style>
+          <a:lnRef idx="2">
+            <a:schemeClr val="accent1"/>
+          </a:lnRef>
+          <a:fillRef idx="1">
+            <a:schemeClr val="lt1"/>
+          </a:fillRef>
+          <a:effectRef idx="0">
+            <a:schemeClr val="accent1"/>
+          </a:effectRef>
+          <a:fontRef idx="minor">
+            <a:schemeClr val="dk1"/>
+          </a:fontRef>
+        </p:style>
+        <p:txBody>
+          <a:bodyPr rtlCol="0" anchor="ctr"/>
+          <a:lstStyle/>
+          <a:p>
+            <a:pPr algn="ctr"/>
+            <a:r>
+              <a:rPr lang="en-US" dirty="0" smtClean="0"/>
+              <a:t>System/Module 1</a:t>
+            </a:r>
+            <a:endParaRPr lang="en-ZA" dirty="0"/>
+          </a:p>
+        </p:txBody>
+      </p:sp>
+      <p:sp>
+        <p:nvSpPr>
+          <p:cNvPr id="5" name="Rectangle 4"/>
+          <p:cNvSpPr/>
+          <p:nvPr/>
+        </p:nvSpPr>
+        <p:spPr>
+          <a:xfrm>
+            <a:off x="9469581" y="3539838"/>
+            <a:ext cx="2563091" cy="2563091"/>
+          </a:xfrm>
+          <a:prstGeom prst="rect">
+            <a:avLst/>
+          </a:prstGeom>
+          <a:ln w="76200"/>
+        </p:spPr>
+        <p:style>
+          <a:lnRef idx="2">
+            <a:schemeClr val="accent1"/>
+          </a:lnRef>
+          <a:fillRef idx="1">
+            <a:schemeClr val="lt1"/>
+          </a:fillRef>
+          <a:effectRef idx="0">
+            <a:schemeClr val="accent1"/>
+          </a:effectRef>
+          <a:fontRef idx="minor">
+            <a:schemeClr val="dk1"/>
+          </a:fontRef>
+        </p:style>
+        <p:txBody>
+          <a:bodyPr rtlCol="0" anchor="ctr"/>
+          <a:lstStyle/>
+          <a:p>
+            <a:pPr algn="ctr"/>
+            <a:r>
+              <a:rPr lang="en-US" dirty="0" smtClean="0"/>
+              <a:t>System/Module 2</a:t>
+            </a:r>
+            <a:endParaRPr lang="en-ZA" dirty="0"/>
+          </a:p>
+        </p:txBody>
+      </p:sp>
+      <p:cxnSp>
+        <p:nvCxnSpPr>
+          <p:cNvPr id="7" name="Straight Arrow Connector 6"/>
+          <p:cNvCxnSpPr/>
+          <p:nvPr/>
+        </p:nvCxnSpPr>
+        <p:spPr>
+          <a:xfrm>
+            <a:off x="7197436" y="4253348"/>
+            <a:ext cx="2272145" cy="0"/>
+          </a:xfrm>
+          <a:prstGeom prst="straightConnector1">
+            <a:avLst/>
+          </a:prstGeom>
+          <a:ln>
+            <a:tailEnd type="arrow"/>
+          </a:ln>
+        </p:spPr>
+        <p:style>
+          <a:lnRef idx="1">
+            <a:schemeClr val="accent3"/>
+          </a:lnRef>
+          <a:fillRef idx="0">
+            <a:schemeClr val="accent3"/>
+          </a:fillRef>
+          <a:effectRef idx="0">
+            <a:schemeClr val="accent3"/>
+          </a:effectRef>
+          <a:fontRef idx="minor">
+            <a:schemeClr val="tx1"/>
+          </a:fontRef>
+        </p:style>
+      </p:cxnSp>
+      <p:cxnSp>
+        <p:nvCxnSpPr>
+          <p:cNvPr id="8" name="Straight Arrow Connector 7"/>
+          <p:cNvCxnSpPr/>
+          <p:nvPr/>
+        </p:nvCxnSpPr>
+        <p:spPr>
+          <a:xfrm flipH="1">
+            <a:off x="7197436" y="5645729"/>
+            <a:ext cx="2272145" cy="0"/>
+          </a:xfrm>
+          <a:prstGeom prst="straightConnector1">
+            <a:avLst/>
+          </a:prstGeom>
+          <a:ln>
+            <a:tailEnd type="arrow"/>
+          </a:ln>
+        </p:spPr>
+        <p:style>
+          <a:lnRef idx="1">
+            <a:schemeClr val="accent3"/>
+          </a:lnRef>
+          <a:fillRef idx="0">
+            <a:schemeClr val="accent3"/>
+          </a:fillRef>
+          <a:effectRef idx="0">
+            <a:schemeClr val="accent3"/>
+          </a:effectRef>
+          <a:fontRef idx="minor">
+            <a:schemeClr val="tx1"/>
+          </a:fontRef>
+        </p:style>
+      </p:cxnSp>
     </p:spTree>
     <p:extLst>
       <p:ext uri="{BB962C8B-B14F-4D97-AF65-F5344CB8AC3E}">
@@ -7781,8 +8030,39 @@
           <a:p>
             <a:r>
               <a:rPr lang="en-US" dirty="0" smtClean="0"/>
-              <a:t>Can have sub layers</a:t>
-            </a:r>
+              <a:t>Can have sub </a:t>
+            </a:r>
+            <a:r>
+              <a:rPr lang="en-US" dirty="0" smtClean="0"/>
+              <a:t>layers</a:t>
+            </a:r>
+          </a:p>
+          <a:p>
+            <a:pPr lvl="1"/>
+            <a:r>
+              <a:rPr lang="en-US" dirty="0" smtClean="0"/>
+              <a:t>Layers that bypass rules</a:t>
+            </a:r>
+          </a:p>
+          <a:p>
+            <a:pPr lvl="1"/>
+            <a:r>
+              <a:rPr lang="en-US" dirty="0" smtClean="0"/>
+              <a:t>Stubs</a:t>
+            </a:r>
+          </a:p>
+          <a:p>
+            <a:r>
+              <a:rPr lang="en-US" dirty="0" smtClean="0"/>
+              <a:t>Layers should only talk to the one above and below</a:t>
+            </a:r>
+          </a:p>
+          <a:p>
+            <a:r>
+              <a:rPr lang="en-US" dirty="0" smtClean="0"/>
+              <a:t>Should not directly ‘step over’ a layer</a:t>
+            </a:r>
+            <a:endParaRPr lang="en-US" dirty="0" smtClean="0"/>
           </a:p>
           <a:p>
             <a:r>
@@ -7824,7 +8104,7 @@
         </p:blipFill>
         <p:spPr bwMode="auto">
           <a:xfrm>
-            <a:off x="8058583" y="1188892"/>
+            <a:off x="8058583" y="1438274"/>
             <a:ext cx="3362325" cy="5076825"/>
           </a:xfrm>
           <a:prstGeom prst="rect">
@@ -8054,8 +8334,8 @@
           <a:lstStyle/>
           <a:p>
             <a:r>
-              <a:rPr lang="en-US" dirty="0" smtClean="0"/>
-              <a:t>Modular Development</a:t>
+              <a:rPr lang="en-ZA" dirty="0" smtClean="0"/>
+              <a:t>Model View Controller (MVC)</a:t>
             </a:r>
             <a:endParaRPr lang="en-ZA" dirty="0"/>
           </a:p>
@@ -8076,80 +8356,99 @@
           <a:bodyPr/>
           <a:lstStyle/>
           <a:p>
-            <a:r>
-              <a:rPr lang="en-US" dirty="0" smtClean="0"/>
-              <a:t>Code is broken up into modules</a:t>
-            </a:r>
-          </a:p>
-          <a:p>
-            <a:r>
-              <a:rPr lang="en-US" dirty="0" smtClean="0"/>
-              <a:t>Concerns are broken up into modular parts</a:t>
-            </a:r>
-          </a:p>
-          <a:p>
-            <a:r>
-              <a:rPr lang="en-US" dirty="0" smtClean="0"/>
-              <a:t>Written separately and shared across</a:t>
-            </a:r>
-          </a:p>
-          <a:p>
-            <a:r>
-              <a:rPr lang="en-US" dirty="0" smtClean="0"/>
-              <a:t>Can have independent development teams</a:t>
-            </a:r>
-          </a:p>
-          <a:p>
-            <a:r>
-              <a:rPr lang="en-US" dirty="0" smtClean="0"/>
-              <a:t>Code reuse is very strong</a:t>
-            </a:r>
-          </a:p>
-          <a:p>
-            <a:r>
-              <a:rPr lang="en-US" dirty="0" smtClean="0"/>
-              <a:t>There are some downsides</a:t>
-            </a:r>
-          </a:p>
-          <a:p>
-            <a:pPr lvl="1"/>
-            <a:r>
-              <a:rPr lang="en-US" dirty="0" smtClean="0"/>
-              <a:t>Lack of testing – its harder</a:t>
-            </a:r>
-          </a:p>
-          <a:p>
-            <a:pPr lvl="1"/>
-            <a:r>
-              <a:rPr lang="en-US" dirty="0" smtClean="0"/>
-              <a:t>Inconsistent programming</a:t>
-            </a:r>
-          </a:p>
-          <a:p>
-            <a:pPr lvl="1"/>
-            <a:r>
-              <a:rPr lang="en-US" dirty="0" smtClean="0"/>
-              <a:t>Dependent on potentially unknown software</a:t>
-            </a:r>
-          </a:p>
-          <a:p>
+            <a:pPr fontAlgn="base">
+              <a:buFont typeface="Arial" panose="020B0604020202020204" pitchFamily="34" charset="0"/>
+              <a:buChar char="•"/>
+            </a:pPr>
+            <a:r>
+              <a:rPr lang="en-ZA" dirty="0" smtClean="0"/>
+              <a:t>Models</a:t>
+            </a:r>
             <a:r>
               <a:rPr lang="en-ZA" dirty="0"/>
-              <a:t>https://en.wikipedia.org/wiki/Modular_programming</a:t>
-            </a:r>
+              <a:t>: Classes that represent the data of the application and that use validation logic to enforce business rules for that data.</a:t>
+            </a:r>
+          </a:p>
+          <a:p>
+            <a:pPr fontAlgn="base">
+              <a:buFont typeface="Arial" panose="020B0604020202020204" pitchFamily="34" charset="0"/>
+              <a:buChar char="•"/>
+            </a:pPr>
+            <a:r>
+              <a:rPr lang="en-ZA" dirty="0"/>
+              <a:t>Views: Template files that your application uses to dynamically generate HTML responses.</a:t>
+            </a:r>
+          </a:p>
+          <a:p>
+            <a:pPr fontAlgn="base">
+              <a:buFont typeface="Arial" panose="020B0604020202020204" pitchFamily="34" charset="0"/>
+              <a:buChar char="•"/>
+            </a:pPr>
+            <a:r>
+              <a:rPr lang="en-ZA" dirty="0"/>
+              <a:t>Controllers: Classes that handle incoming browser requests, retrieve model data, and then specify view templates that return a response to the </a:t>
+            </a:r>
+            <a:r>
+              <a:rPr lang="en-ZA" dirty="0" smtClean="0"/>
+              <a:t>browser</a:t>
+            </a:r>
+          </a:p>
+          <a:p>
+            <a:pPr fontAlgn="base">
+              <a:buFont typeface="Arial" panose="020B0604020202020204" pitchFamily="34" charset="0"/>
+              <a:buChar char="•"/>
+            </a:pPr>
+            <a:endParaRPr lang="en-ZA" dirty="0"/>
+          </a:p>
+          <a:p>
+            <a:pPr fontAlgn="base">
+              <a:buFont typeface="Arial" panose="020B0604020202020204" pitchFamily="34" charset="0"/>
+              <a:buChar char="•"/>
+            </a:pPr>
+            <a:r>
+              <a:rPr lang="en-ZA" dirty="0" smtClean="0"/>
+              <a:t>Structures code</a:t>
+            </a:r>
+          </a:p>
+          <a:p>
+            <a:pPr fontAlgn="base">
+              <a:buFont typeface="Arial" panose="020B0604020202020204" pitchFamily="34" charset="0"/>
+              <a:buChar char="•"/>
+            </a:pPr>
+            <a:r>
+              <a:rPr lang="en-ZA" dirty="0" smtClean="0"/>
+              <a:t>Makes it more testable</a:t>
+            </a:r>
+          </a:p>
+          <a:p>
+            <a:pPr>
+              <a:buFont typeface="Arial" panose="020B0604020202020204" pitchFamily="34" charset="0"/>
+              <a:buChar char="•"/>
+            </a:pPr>
+            <a:endParaRPr lang="en-ZA" dirty="0"/>
+          </a:p>
+          <a:p>
+            <a:endParaRPr lang="en-ZA" dirty="0"/>
           </a:p>
         </p:txBody>
       </p:sp>
     </p:spTree>
     <p:extLst>
       <p:ext uri="{BB962C8B-B14F-4D97-AF65-F5344CB8AC3E}">
-        <p14:creationId xmlns:p14="http://schemas.microsoft.com/office/powerpoint/2010/main" val="2741912272"/>
+        <p14:creationId xmlns:p14="http://schemas.microsoft.com/office/powerpoint/2010/main" val="2592488307"/>
       </p:ext>
     </p:extLst>
   </p:cSld>
   <p:clrMapOvr>
     <a:masterClrMapping/>
   </p:clrMapOvr>
+  <p:timing>
+    <p:tnLst>
+      <p:par>
+        <p:cTn id="1" dur="indefinite" restart="never" nodeType="tmRoot"/>
+      </p:par>
+    </p:tnLst>
+  </p:timing>
 </p:sld>
 </file>
 
@@ -8186,157 +8485,6 @@
           <a:lstStyle/>
           <a:p>
             <a:r>
-              <a:rPr lang="en-ZA" dirty="0" smtClean="0"/>
-              <a:t>Model View Controller (MVC)</a:t>
-            </a:r>
-            <a:endParaRPr lang="en-ZA" dirty="0"/>
-          </a:p>
-        </p:txBody>
-      </p:sp>
-      <p:sp>
-        <p:nvSpPr>
-          <p:cNvPr id="3" name="Content Placeholder 2"/>
-          <p:cNvSpPr>
-            <a:spLocks noGrp="1"/>
-          </p:cNvSpPr>
-          <p:nvPr>
-            <p:ph idx="1"/>
-          </p:nvPr>
-        </p:nvSpPr>
-        <p:spPr/>
-        <p:txBody>
-          <a:bodyPr/>
-          <a:lstStyle/>
-          <a:p>
-            <a:pPr fontAlgn="base">
-              <a:buFont typeface="Arial" panose="020B0604020202020204" pitchFamily="34" charset="0"/>
-              <a:buChar char="•"/>
-            </a:pPr>
-            <a:r>
-              <a:rPr lang="en-ZA" dirty="0" smtClean="0"/>
-              <a:t>Models</a:t>
-            </a:r>
-            <a:r>
-              <a:rPr lang="en-ZA" dirty="0"/>
-              <a:t>: Classes that represent the data of the application and that use validation logic to enforce business rules for that data.</a:t>
-            </a:r>
-          </a:p>
-          <a:p>
-            <a:pPr fontAlgn="base">
-              <a:buFont typeface="Arial" panose="020B0604020202020204" pitchFamily="34" charset="0"/>
-              <a:buChar char="•"/>
-            </a:pPr>
-            <a:r>
-              <a:rPr lang="en-ZA" dirty="0"/>
-              <a:t>Views: Template files that your application uses to dynamically generate HTML responses.</a:t>
-            </a:r>
-          </a:p>
-          <a:p>
-            <a:pPr fontAlgn="base">
-              <a:buFont typeface="Arial" panose="020B0604020202020204" pitchFamily="34" charset="0"/>
-              <a:buChar char="•"/>
-            </a:pPr>
-            <a:r>
-              <a:rPr lang="en-ZA" dirty="0"/>
-              <a:t>Controllers: Classes that handle incoming browser requests, retrieve model data, and then specify view templates that return a response to the </a:t>
-            </a:r>
-            <a:r>
-              <a:rPr lang="en-ZA" dirty="0" smtClean="0"/>
-              <a:t>browser</a:t>
-            </a:r>
-          </a:p>
-          <a:p>
-            <a:pPr fontAlgn="base">
-              <a:buFont typeface="Arial" panose="020B0604020202020204" pitchFamily="34" charset="0"/>
-              <a:buChar char="•"/>
-            </a:pPr>
-            <a:endParaRPr lang="en-ZA" dirty="0"/>
-          </a:p>
-          <a:p>
-            <a:pPr fontAlgn="base">
-              <a:buFont typeface="Arial" panose="020B0604020202020204" pitchFamily="34" charset="0"/>
-              <a:buChar char="•"/>
-            </a:pPr>
-            <a:r>
-              <a:rPr lang="en-ZA" dirty="0" smtClean="0"/>
-              <a:t>Structures code</a:t>
-            </a:r>
-          </a:p>
-          <a:p>
-            <a:pPr fontAlgn="base">
-              <a:buFont typeface="Arial" panose="020B0604020202020204" pitchFamily="34" charset="0"/>
-              <a:buChar char="•"/>
-            </a:pPr>
-            <a:r>
-              <a:rPr lang="en-ZA" dirty="0" smtClean="0"/>
-              <a:t>Makes it more testable</a:t>
-            </a:r>
-          </a:p>
-          <a:p>
-            <a:pPr>
-              <a:buFont typeface="Arial" panose="020B0604020202020204" pitchFamily="34" charset="0"/>
-              <a:buChar char="•"/>
-            </a:pPr>
-            <a:endParaRPr lang="en-ZA" dirty="0"/>
-          </a:p>
-          <a:p>
-            <a:endParaRPr lang="en-ZA" dirty="0"/>
-          </a:p>
-        </p:txBody>
-      </p:sp>
-    </p:spTree>
-    <p:extLst>
-      <p:ext uri="{BB962C8B-B14F-4D97-AF65-F5344CB8AC3E}">
-        <p14:creationId xmlns:p14="http://schemas.microsoft.com/office/powerpoint/2010/main" val="2592488307"/>
-      </p:ext>
-    </p:extLst>
-  </p:cSld>
-  <p:clrMapOvr>
-    <a:masterClrMapping/>
-  </p:clrMapOvr>
-  <p:timing>
-    <p:tnLst>
-      <p:par>
-        <p:cTn id="1" dur="indefinite" restart="never" nodeType="tmRoot"/>
-      </p:par>
-    </p:tnLst>
-  </p:timing>
-</p:sld>
-</file>
-
-<file path=ppt/slides/slide22.xml><?xml version="1.0" encoding="utf-8"?>
-<p:sld xmlns:a="http://schemas.openxmlformats.org/drawingml/2006/main" xmlns:r="http://schemas.openxmlformats.org/officeDocument/2006/relationships" xmlns:p="http://schemas.openxmlformats.org/presentationml/2006/main">
-  <p:cSld>
-    <p:spTree>
-      <p:nvGrpSpPr>
-        <p:cNvPr id="1" name=""/>
-        <p:cNvGrpSpPr/>
-        <p:nvPr/>
-      </p:nvGrpSpPr>
-      <p:grpSpPr>
-        <a:xfrm>
-          <a:off x="0" y="0"/>
-          <a:ext cx="0" cy="0"/>
-          <a:chOff x="0" y="0"/>
-          <a:chExt cx="0" cy="0"/>
-        </a:xfrm>
-      </p:grpSpPr>
-      <p:sp>
-        <p:nvSpPr>
-          <p:cNvPr id="2" name="Title 1"/>
-          <p:cNvSpPr>
-            <a:spLocks noGrp="1"/>
-          </p:cNvSpPr>
-          <p:nvPr>
-            <p:ph type="title"/>
-          </p:nvPr>
-        </p:nvSpPr>
-        <p:spPr/>
-        <p:txBody>
-          <a:bodyPr/>
-          <a:lstStyle/>
-          <a:p>
-            <a:r>
               <a:rPr lang="en-US" dirty="0" smtClean="0"/>
               <a:t>Event Driven Model</a:t>
             </a:r>
@@ -8366,7 +8514,36 @@
           <a:p>
             <a:r>
               <a:rPr lang="en-US" dirty="0" smtClean="0"/>
-              <a:t>Used in programming and the system design</a:t>
+              <a:t>System waits in a loop for some kind of event</a:t>
+            </a:r>
+          </a:p>
+          <a:p>
+            <a:r>
+              <a:rPr lang="en-US" dirty="0" smtClean="0"/>
+              <a:t>When the event occurs the system determines what to do</a:t>
+            </a:r>
+          </a:p>
+          <a:p>
+            <a:r>
+              <a:rPr lang="en-US" dirty="0" smtClean="0"/>
+              <a:t>That action is taken</a:t>
+            </a:r>
+          </a:p>
+          <a:p>
+            <a:r>
+              <a:rPr lang="en-US" dirty="0" smtClean="0"/>
+              <a:t>There are two main models for this kind of system</a:t>
+            </a:r>
+            <a:endParaRPr lang="en-US" dirty="0" smtClean="0"/>
+          </a:p>
+          <a:p>
+            <a:r>
+              <a:rPr lang="en-US" dirty="0" smtClean="0"/>
+              <a:t>Used </a:t>
+            </a:r>
+            <a:r>
+              <a:rPr lang="en-US" dirty="0" smtClean="0"/>
+              <a:t>in programming and the system design</a:t>
             </a:r>
           </a:p>
           <a:p>
@@ -8436,6 +8613,155 @@
 </p:sld>
 </file>
 
+<file path=ppt/slides/slide22.xml><?xml version="1.0" encoding="utf-8"?>
+<p:sld xmlns:a="http://schemas.openxmlformats.org/drawingml/2006/main" xmlns:r="http://schemas.openxmlformats.org/officeDocument/2006/relationships" xmlns:p="http://schemas.openxmlformats.org/presentationml/2006/main">
+  <p:cSld>
+    <p:spTree>
+      <p:nvGrpSpPr>
+        <p:cNvPr id="1" name=""/>
+        <p:cNvGrpSpPr/>
+        <p:nvPr/>
+      </p:nvGrpSpPr>
+      <p:grpSpPr>
+        <a:xfrm>
+          <a:off x="0" y="0"/>
+          <a:ext cx="0" cy="0"/>
+          <a:chOff x="0" y="0"/>
+          <a:chExt cx="0" cy="0"/>
+        </a:xfrm>
+      </p:grpSpPr>
+      <p:sp>
+        <p:nvSpPr>
+          <p:cNvPr id="2" name="Title 1"/>
+          <p:cNvSpPr>
+            <a:spLocks noGrp="1"/>
+          </p:cNvSpPr>
+          <p:nvPr>
+            <p:ph type="title"/>
+          </p:nvPr>
+        </p:nvSpPr>
+        <p:spPr/>
+        <p:txBody>
+          <a:bodyPr/>
+          <a:lstStyle/>
+          <a:p>
+            <a:r>
+              <a:rPr lang="en-US" dirty="0" smtClean="0"/>
+              <a:t>Modular Development</a:t>
+            </a:r>
+            <a:endParaRPr lang="en-ZA" dirty="0"/>
+          </a:p>
+        </p:txBody>
+      </p:sp>
+      <p:sp>
+        <p:nvSpPr>
+          <p:cNvPr id="3" name="Content Placeholder 2"/>
+          <p:cNvSpPr>
+            <a:spLocks noGrp="1"/>
+          </p:cNvSpPr>
+          <p:nvPr>
+            <p:ph idx="1"/>
+          </p:nvPr>
+        </p:nvSpPr>
+        <p:spPr>
+          <a:xfrm>
+            <a:off x="1144876" y="1498736"/>
+            <a:ext cx="8946541" cy="4195481"/>
+          </a:xfrm>
+        </p:spPr>
+        <p:txBody>
+          <a:bodyPr>
+            <a:normAutofit/>
+          </a:bodyPr>
+          <a:lstStyle/>
+          <a:p>
+            <a:r>
+              <a:rPr lang="en-US" dirty="0" smtClean="0"/>
+              <a:t>Code is broken up into modules</a:t>
+            </a:r>
+          </a:p>
+          <a:p>
+            <a:r>
+              <a:rPr lang="en-US" dirty="0" smtClean="0"/>
+              <a:t>Concerns are broken up into modular parts</a:t>
+            </a:r>
+          </a:p>
+          <a:p>
+            <a:r>
+              <a:rPr lang="en-US" dirty="0" smtClean="0"/>
+              <a:t>Written separately and shared </a:t>
+            </a:r>
+            <a:r>
+              <a:rPr lang="en-US" dirty="0" smtClean="0"/>
+              <a:t>across the project or the net</a:t>
+            </a:r>
+            <a:endParaRPr lang="en-US" dirty="0" smtClean="0"/>
+          </a:p>
+          <a:p>
+            <a:r>
+              <a:rPr lang="en-US" dirty="0" smtClean="0"/>
+              <a:t>Can have independent development teams</a:t>
+            </a:r>
+          </a:p>
+          <a:p>
+            <a:r>
+              <a:rPr lang="en-US" dirty="0" smtClean="0"/>
+              <a:t>Code reuse is very strong</a:t>
+            </a:r>
+          </a:p>
+          <a:p>
+            <a:r>
+              <a:rPr lang="en-US" dirty="0" smtClean="0"/>
+              <a:t>There are some downsides</a:t>
+            </a:r>
+          </a:p>
+          <a:p>
+            <a:pPr lvl="1"/>
+            <a:r>
+              <a:rPr lang="en-US" dirty="0" smtClean="0"/>
+              <a:t>Lack of testing – its harder</a:t>
+            </a:r>
+          </a:p>
+          <a:p>
+            <a:pPr lvl="1"/>
+            <a:r>
+              <a:rPr lang="en-US" dirty="0" smtClean="0"/>
+              <a:t>Inconsistent programming</a:t>
+            </a:r>
+          </a:p>
+          <a:p>
+            <a:pPr lvl="1"/>
+            <a:r>
+              <a:rPr lang="en-US" dirty="0" smtClean="0"/>
+              <a:t>Dependent on potentially unknown </a:t>
+            </a:r>
+            <a:r>
+              <a:rPr lang="en-US" dirty="0" smtClean="0"/>
+              <a:t>software and developers</a:t>
+            </a:r>
+            <a:endParaRPr lang="en-US" dirty="0" smtClean="0"/>
+          </a:p>
+          <a:p>
+            <a:r>
+              <a:rPr lang="en-ZA" dirty="0"/>
+              <a:t>https://en.wikipedia.org/wiki/Modular_programming</a:t>
+            </a:r>
+          </a:p>
+        </p:txBody>
+      </p:sp>
+    </p:spTree>
+    <p:extLst>
+      <p:ext uri="{BB962C8B-B14F-4D97-AF65-F5344CB8AC3E}">
+        <p14:creationId xmlns:p14="http://schemas.microsoft.com/office/powerpoint/2010/main" val="2741912272"/>
+      </p:ext>
+    </p:extLst>
+  </p:cSld>
+  <p:clrMapOvr>
+    <a:masterClrMapping/>
+  </p:clrMapOvr>
+</p:sld>
+</file>
+
 <file path=ppt/slides/slide23.xml><?xml version="1.0" encoding="utf-8"?>
 <p:sld xmlns:a="http://schemas.openxmlformats.org/drawingml/2006/main" xmlns:r="http://schemas.openxmlformats.org/officeDocument/2006/relationships" xmlns:p="http://schemas.openxmlformats.org/presentationml/2006/main">
   <p:cSld>
@@ -8651,7 +8977,9 @@
           </a:xfrm>
         </p:spPr>
         <p:txBody>
-          <a:bodyPr/>
+          <a:bodyPr>
+            <a:normAutofit/>
+          </a:bodyPr>
           <a:lstStyle/>
           <a:p>
             <a:r>
@@ -8692,7 +9020,15 @@
           <a:p>
             <a:r>
               <a:rPr lang="en-US" dirty="0" smtClean="0"/>
-              <a:t>The program must then print the files in that folder to the console.</a:t>
+              <a:t>The program must then print the files in that folder to the </a:t>
+            </a:r>
+            <a:r>
+              <a:rPr lang="en-US" smtClean="0"/>
+              <a:t>console</a:t>
+            </a:r>
+            <a:r>
+              <a:rPr lang="en-US" smtClean="0"/>
+              <a:t>.</a:t>
             </a:r>
             <a:endParaRPr lang="en-ZA" dirty="0" smtClean="0"/>
           </a:p>
@@ -10272,12 +10608,12 @@
               <a:t>Attempts to reduce </a:t>
             </a:r>
             <a:r>
-              <a:rPr lang="en-ZA" dirty="0" err="1" smtClean="0"/>
-              <a:t>inherint</a:t>
-            </a:r>
-            <a:r>
-              <a:rPr lang="en-ZA" dirty="0" smtClean="0"/>
-              <a:t> project risk</a:t>
+              <a:rPr lang="en-ZA" dirty="0" smtClean="0"/>
+              <a:t>inherent </a:t>
+            </a:r>
+            <a:r>
+              <a:rPr lang="en-ZA" dirty="0" smtClean="0"/>
+              <a:t>project risk</a:t>
             </a:r>
           </a:p>
           <a:p>
@@ -10790,7 +11126,7 @@
   <a:extraClrSchemeLst/>
   <a:extLst>
     <a:ext uri="{05A4C25C-085E-4340-85A3-A5531E510DB2}">
-      <thm15:themeFamily xmlns:thm15="http://schemas.microsoft.com/office/thememl/2012/main" xmlns="" name="Ion" id="{B8441ADB-2E43-4AF7-B97A-BD870242C6A8}" vid="{A207AED3-9ABC-4A18-9978-A59B65688B15}"/>
+      <thm15:themeFamily xmlns="" xmlns:thm15="http://schemas.microsoft.com/office/thememl/2012/main" name="Ion" id="{B8441ADB-2E43-4AF7-B97A-BD870242C6A8}" vid="{A207AED3-9ABC-4A18-9978-A59B65688B15}"/>
     </a:ext>
   </a:extLst>
 </a:theme>

</xml_diff>

<commit_message>
final for session 2
</commit_message>
<xml_diff>
--- a/Session 2/Softdev Session 2 2016.pptx
+++ b/Session 2/Softdev Session 2 2016.pptx
@@ -8625,6 +8625,13 @@
   <p:clrMapOvr>
     <a:masterClrMapping/>
   </p:clrMapOvr>
+  <p:timing>
+    <p:tnLst>
+      <p:par>
+        <p:cTn id="1" dur="indefinite" restart="never" nodeType="tmRoot"/>
+      </p:par>
+    </p:tnLst>
+  </p:timing>
 </p:sld>
 </file>
 
@@ -8765,6 +8772,13 @@
   <p:clrMapOvr>
     <a:masterClrMapping/>
   </p:clrMapOvr>
+  <p:timing>
+    <p:tnLst>
+      <p:par>
+        <p:cTn id="1" dur="indefinite" restart="never" nodeType="tmRoot"/>
+      </p:par>
+    </p:tnLst>
+  </p:timing>
 </p:sld>
 </file>
 
@@ -8904,6 +8918,13 @@
   <p:clrMapOvr>
     <a:masterClrMapping/>
   </p:clrMapOvr>
+  <p:timing>
+    <p:tnLst>
+      <p:par>
+        <p:cTn id="1" dur="indefinite" restart="never" nodeType="tmRoot"/>
+      </p:par>
+    </p:tnLst>
+  </p:timing>
 </p:sld>
 </file>
 
@@ -8974,16 +8995,17 @@
           <a:p>
             <a:r>
               <a:rPr lang="en-US" dirty="0" smtClean="0"/>
-              <a:t>express –</a:t>
-            </a:r>
-            <a:r>
-              <a:rPr lang="en-US" dirty="0" err="1" smtClean="0"/>
-              <a:t>ejs</a:t>
-            </a:r>
-            <a:r>
-              <a:rPr lang="en-US" dirty="0" smtClean="0"/>
-              <a:t> </a:t>
-            </a:r>
+              <a:t>express </a:t>
+            </a:r>
+            <a:r>
+              <a:rPr lang="en-US" smtClean="0"/>
+              <a:t>–</a:t>
+            </a:r>
+            <a:r>
+              <a:rPr lang="en-US" smtClean="0"/>
+              <a:t>e</a:t>
+            </a:r>
+            <a:endParaRPr lang="en-US" dirty="0" smtClean="0"/>
           </a:p>
           <a:p>
             <a:pPr lvl="1"/>
@@ -9062,6 +9084,13 @@
   <p:clrMapOvr>
     <a:masterClrMapping/>
   </p:clrMapOvr>
+  <p:timing>
+    <p:tnLst>
+      <p:par>
+        <p:cTn id="1" dur="indefinite" restart="never" nodeType="tmRoot"/>
+      </p:par>
+    </p:tnLst>
+  </p:timing>
 </p:sld>
 </file>
 
@@ -9223,6 +9252,13 @@
   <p:clrMapOvr>
     <a:masterClrMapping/>
   </p:clrMapOvr>
+  <p:timing>
+    <p:tnLst>
+      <p:par>
+        <p:cTn id="1" dur="indefinite" restart="never" nodeType="tmRoot"/>
+      </p:par>
+    </p:tnLst>
+  </p:timing>
 </p:sld>
 </file>
 
@@ -9381,6 +9417,13 @@
   <p:clrMapOvr>
     <a:masterClrMapping/>
   </p:clrMapOvr>
+  <p:timing>
+    <p:tnLst>
+      <p:par>
+        <p:cTn id="1" dur="indefinite" restart="never" nodeType="tmRoot"/>
+      </p:par>
+    </p:tnLst>
+  </p:timing>
 </p:sld>
 </file>
 

</xml_diff>